<commit_message>
couple of changes to presentation
</commit_message>
<xml_diff>
--- a/DataFlow1.pptx
+++ b/DataFlow1.pptx
@@ -18,10 +18,10 @@
     <p:sldId id="286" r:id="rId9"/>
     <p:sldId id="283" r:id="rId10"/>
     <p:sldId id="308" r:id="rId11"/>
-    <p:sldId id="291" r:id="rId12"/>
-    <p:sldId id="289" r:id="rId13"/>
-    <p:sldId id="290" r:id="rId14"/>
-    <p:sldId id="282" r:id="rId15"/>
+    <p:sldId id="282" r:id="rId12"/>
+    <p:sldId id="291" r:id="rId13"/>
+    <p:sldId id="289" r:id="rId14"/>
+    <p:sldId id="290" r:id="rId15"/>
     <p:sldId id="263" r:id="rId16"/>
     <p:sldId id="276" r:id="rId17"/>
     <p:sldId id="293" r:id="rId18"/>
@@ -227,7 +227,7 @@
           <a:p>
             <a:fld id="{5B9CBD88-31B2-0A43-94D7-6B434EF42995}" type="datetimeFigureOut">
               <a:rPr lang="en-US" smtClean="0"/>
-              <a:t>5/9/16</a:t>
+              <a:t>5/10/16</a:t>
             </a:fld>
             <a:endParaRPr lang="en-US"/>
           </a:p>
@@ -522,7 +522,12 @@
             <p:ph type="sldImg"/>
           </p:nvPr>
         </p:nvSpPr>
-        <p:spPr/>
+        <p:spPr>
+          <a:xfrm>
+            <a:off x="1143000" y="685800"/>
+            <a:ext cx="4572000" cy="3429000"/>
+          </a:xfrm>
+        </p:spPr>
       </p:sp>
       <p:sp>
         <p:nvSpPr>
@@ -769,7 +774,12 @@
             <p:ph type="sldImg"/>
           </p:nvPr>
         </p:nvSpPr>
-        <p:spPr/>
+        <p:spPr>
+          <a:xfrm>
+            <a:off x="1143000" y="685800"/>
+            <a:ext cx="4572000" cy="3429000"/>
+          </a:xfrm>
+        </p:spPr>
       </p:sp>
       <p:sp>
         <p:nvSpPr>
@@ -853,7 +863,12 @@
             <p:ph type="sldImg"/>
           </p:nvPr>
         </p:nvSpPr>
-        <p:spPr/>
+        <p:spPr>
+          <a:xfrm>
+            <a:off x="1143000" y="685800"/>
+            <a:ext cx="4572000" cy="3429000"/>
+          </a:xfrm>
+        </p:spPr>
       </p:sp>
       <p:sp>
         <p:nvSpPr>
@@ -901,6 +916,94 @@
     <p:extLst>
       <p:ext uri="{BB962C8B-B14F-4D97-AF65-F5344CB8AC3E}">
         <p14:creationId xmlns:p14="http://schemas.microsoft.com/office/powerpoint/2010/main" val="2793315777"/>
+      </p:ext>
+    </p:extLst>
+  </p:cSld>
+  <p:clrMapOvr>
+    <a:masterClrMapping/>
+  </p:clrMapOvr>
+</p:notes>
+</file>
+
+<file path=ppt/notesSlides/notesSlide4.xml><?xml version="1.0" encoding="utf-8"?>
+<p:notes xmlns:a="http://schemas.openxmlformats.org/drawingml/2006/main" xmlns:r="http://schemas.openxmlformats.org/officeDocument/2006/relationships" xmlns:p="http://schemas.openxmlformats.org/presentationml/2006/main">
+  <p:cSld>
+    <p:spTree>
+      <p:nvGrpSpPr>
+        <p:cNvPr id="1" name=""/>
+        <p:cNvGrpSpPr/>
+        <p:nvPr/>
+      </p:nvGrpSpPr>
+      <p:grpSpPr>
+        <a:xfrm>
+          <a:off x="0" y="0"/>
+          <a:ext cx="0" cy="0"/>
+          <a:chOff x="0" y="0"/>
+          <a:chExt cx="0" cy="0"/>
+        </a:xfrm>
+      </p:grpSpPr>
+      <p:sp>
+        <p:nvSpPr>
+          <p:cNvPr id="2" name="Slide Image Placeholder 1"/>
+          <p:cNvSpPr>
+            <a:spLocks noGrp="1" noRot="1" noChangeAspect="1"/>
+          </p:cNvSpPr>
+          <p:nvPr>
+            <p:ph type="sldImg"/>
+          </p:nvPr>
+        </p:nvSpPr>
+        <p:spPr/>
+      </p:sp>
+      <p:sp>
+        <p:nvSpPr>
+          <p:cNvPr id="3" name="Notes Placeholder 2"/>
+          <p:cNvSpPr>
+            <a:spLocks noGrp="1"/>
+          </p:cNvSpPr>
+          <p:nvPr>
+            <p:ph type="body" idx="1"/>
+          </p:nvPr>
+        </p:nvSpPr>
+        <p:spPr/>
+        <p:txBody>
+          <a:bodyPr/>
+          <a:lstStyle/>
+          <a:p>
+            <a:r>
+              <a:rPr lang="en-US" dirty="0" smtClean="0"/>
+              <a:t>actuator</a:t>
+            </a:r>
+            <a:endParaRPr lang="en-US" dirty="0"/>
+          </a:p>
+        </p:txBody>
+      </p:sp>
+      <p:sp>
+        <p:nvSpPr>
+          <p:cNvPr id="4" name="Slide Number Placeholder 3"/>
+          <p:cNvSpPr>
+            <a:spLocks noGrp="1"/>
+          </p:cNvSpPr>
+          <p:nvPr>
+            <p:ph type="sldNum" sz="quarter" idx="10"/>
+          </p:nvPr>
+        </p:nvSpPr>
+        <p:spPr/>
+        <p:txBody>
+          <a:bodyPr/>
+          <a:lstStyle/>
+          <a:p>
+            <a:fld id="{B630D0AF-70C0-4B47-B121-68C95D148F32}" type="slidenum">
+              <a:rPr lang="en-US" smtClean="0"/>
+              <a:t>7</a:t>
+            </a:fld>
+            <a:endParaRPr lang="en-US"/>
+          </a:p>
+        </p:txBody>
+      </p:sp>
+    </p:spTree>
+    <p:extLst>
+      <p:ext uri="{BB962C8B-B14F-4D97-AF65-F5344CB8AC3E}">
+        <p14:creationId xmlns:p14="http://schemas.microsoft.com/office/powerpoint/2010/main" val="3240339902"/>
       </p:ext>
     </p:extLst>
   </p:cSld>
@@ -939,7 +1042,7 @@
         </p:nvSpPr>
         <p:spPr>
           <a:xfrm>
-            <a:off x="685800" y="2130425"/>
+            <a:off x="685800" y="2130426"/>
             <a:ext cx="7772400" cy="1470025"/>
           </a:xfrm>
         </p:spPr>
@@ -1091,7 +1194,7 @@
           <a:p>
             <a:fld id="{6242303E-D771-7147-B0E0-2D46590E3D3A}" type="datetimeFigureOut">
               <a:rPr lang="en-US" smtClean="0"/>
-              <a:t>5/9/16</a:t>
+              <a:t>5/10/16</a:t>
             </a:fld>
             <a:endParaRPr lang="en-US"/>
           </a:p>
@@ -1269,7 +1372,7 @@
           <a:p>
             <a:fld id="{6242303E-D771-7147-B0E0-2D46590E3D3A}" type="datetimeFigureOut">
               <a:rPr lang="en-US" smtClean="0"/>
-              <a:t>5/9/16</a:t>
+              <a:t>5/10/16</a:t>
             </a:fld>
             <a:endParaRPr lang="en-US"/>
           </a:p>
@@ -1457,7 +1560,7 @@
           <a:p>
             <a:fld id="{6242303E-D771-7147-B0E0-2D46590E3D3A}" type="datetimeFigureOut">
               <a:rPr lang="en-US" smtClean="0"/>
-              <a:t>5/9/16</a:t>
+              <a:t>5/10/16</a:t>
             </a:fld>
             <a:endParaRPr lang="en-US"/>
           </a:p>
@@ -1635,7 +1738,7 @@
           <a:p>
             <a:fld id="{6242303E-D771-7147-B0E0-2D46590E3D3A}" type="datetimeFigureOut">
               <a:rPr lang="en-US" smtClean="0"/>
-              <a:t>5/9/16</a:t>
+              <a:t>5/10/16</a:t>
             </a:fld>
             <a:endParaRPr lang="en-US"/>
           </a:p>
@@ -1765,7 +1868,7 @@
         </p:nvSpPr>
         <p:spPr>
           <a:xfrm>
-            <a:off x="722313" y="2906713"/>
+            <a:off x="722313" y="2906715"/>
             <a:ext cx="7772400" cy="1500187"/>
           </a:xfrm>
         </p:spPr>
@@ -1889,7 +1992,7 @@
           <a:p>
             <a:fld id="{6242303E-D771-7147-B0E0-2D46590E3D3A}" type="datetimeFigureOut">
               <a:rPr lang="en-US" smtClean="0"/>
-              <a:t>5/9/16</a:t>
+              <a:t>5/10/16</a:t>
             </a:fld>
             <a:endParaRPr lang="en-US"/>
           </a:p>
@@ -2010,8 +2113,8 @@
         </p:nvSpPr>
         <p:spPr>
           <a:xfrm>
-            <a:off x="457200" y="1600200"/>
-            <a:ext cx="4038600" cy="4525963"/>
+            <a:off x="457200" y="1600201"/>
+            <a:ext cx="4038600" cy="4525964"/>
           </a:xfrm>
         </p:spPr>
         <p:txBody>
@@ -2095,8 +2198,8 @@
         </p:nvSpPr>
         <p:spPr>
           <a:xfrm>
-            <a:off x="4648200" y="1600200"/>
-            <a:ext cx="4038600" cy="4525963"/>
+            <a:off x="4648200" y="1600201"/>
+            <a:ext cx="4038600" cy="4525964"/>
           </a:xfrm>
         </p:spPr>
         <p:txBody>
@@ -2185,7 +2288,7 @@
           <a:p>
             <a:fld id="{6242303E-D771-7147-B0E0-2D46590E3D3A}" type="datetimeFigureOut">
               <a:rPr lang="en-US" smtClean="0"/>
-              <a:t>5/9/16</a:t>
+              <a:t>5/10/16</a:t>
             </a:fld>
             <a:endParaRPr lang="en-US"/>
           </a:p>
@@ -2460,7 +2563,7 @@
         </p:nvSpPr>
         <p:spPr>
           <a:xfrm>
-            <a:off x="4645025" y="1535113"/>
+            <a:off x="4645029" y="1535113"/>
             <a:ext cx="4041775" cy="639762"/>
           </a:xfrm>
         </p:spPr>
@@ -2525,7 +2628,7 @@
         </p:nvSpPr>
         <p:spPr>
           <a:xfrm>
-            <a:off x="4645025" y="2174875"/>
+            <a:off x="4645029" y="2174875"/>
             <a:ext cx="4041775" cy="3951288"/>
           </a:xfrm>
         </p:spPr>
@@ -2615,7 +2718,7 @@
           <a:p>
             <a:fld id="{6242303E-D771-7147-B0E0-2D46590E3D3A}" type="datetimeFigureOut">
               <a:rPr lang="en-US" smtClean="0"/>
-              <a:t>5/9/16</a:t>
+              <a:t>5/10/16</a:t>
             </a:fld>
             <a:endParaRPr lang="en-US"/>
           </a:p>
@@ -2741,7 +2844,7 @@
           <a:p>
             <a:fld id="{6242303E-D771-7147-B0E0-2D46590E3D3A}" type="datetimeFigureOut">
               <a:rPr lang="en-US" smtClean="0"/>
-              <a:t>5/9/16</a:t>
+              <a:t>5/10/16</a:t>
             </a:fld>
             <a:endParaRPr lang="en-US"/>
           </a:p>
@@ -2844,7 +2947,7 @@
           <a:p>
             <a:fld id="{6242303E-D771-7147-B0E0-2D46590E3D3A}" type="datetimeFigureOut">
               <a:rPr lang="en-US" smtClean="0"/>
-              <a:t>5/9/16</a:t>
+              <a:t>5/10/16</a:t>
             </a:fld>
             <a:endParaRPr lang="en-US"/>
           </a:p>
@@ -2942,8 +3045,8 @@
         </p:nvSpPr>
         <p:spPr>
           <a:xfrm>
-            <a:off x="457200" y="273050"/>
-            <a:ext cx="3008313" cy="1162050"/>
+            <a:off x="457204" y="273052"/>
+            <a:ext cx="3008313" cy="1162051"/>
           </a:xfrm>
         </p:spPr>
         <p:txBody>
@@ -3059,7 +3162,7 @@
         </p:nvSpPr>
         <p:spPr>
           <a:xfrm>
-            <a:off x="457200" y="1435100"/>
+            <a:off x="457204" y="1435102"/>
             <a:ext cx="3008313" cy="4691063"/>
           </a:xfrm>
         </p:spPr>
@@ -3129,7 +3232,7 @@
           <a:p>
             <a:fld id="{6242303E-D771-7147-B0E0-2D46590E3D3A}" type="datetimeFigureOut">
               <a:rPr lang="en-US" smtClean="0"/>
-              <a:t>5/9/16</a:t>
+              <a:t>5/10/16</a:t>
             </a:fld>
             <a:endParaRPr lang="en-US"/>
           </a:p>
@@ -3320,8 +3423,8 @@
         </p:nvSpPr>
         <p:spPr>
           <a:xfrm>
-            <a:off x="1792288" y="5367338"/>
-            <a:ext cx="5486400" cy="804862"/>
+            <a:off x="1792288" y="5367340"/>
+            <a:ext cx="5486400" cy="804861"/>
           </a:xfrm>
         </p:spPr>
         <p:txBody>
@@ -3390,7 +3493,7 @@
           <a:p>
             <a:fld id="{6242303E-D771-7147-B0E0-2D46590E3D3A}" type="datetimeFigureOut">
               <a:rPr lang="en-US" smtClean="0"/>
-              <a:t>5/9/16</a:t>
+              <a:t>5/10/16</a:t>
             </a:fld>
             <a:endParaRPr lang="en-US"/>
           </a:p>
@@ -3542,8 +3645,8 @@
         </p:nvSpPr>
         <p:spPr>
           <a:xfrm>
-            <a:off x="457200" y="1600200"/>
-            <a:ext cx="8229600" cy="4525963"/>
+            <a:off x="457200" y="1600201"/>
+            <a:ext cx="8229600" cy="4525964"/>
           </a:xfrm>
           <a:prstGeom prst="rect">
             <a:avLst/>
@@ -3604,7 +3707,7 @@
         </p:nvSpPr>
         <p:spPr>
           <a:xfrm>
-            <a:off x="457200" y="6356350"/>
+            <a:off x="457200" y="6356353"/>
             <a:ext cx="2133600" cy="365125"/>
           </a:xfrm>
           <a:prstGeom prst="rect">
@@ -3627,7 +3730,7 @@
           <a:p>
             <a:fld id="{6242303E-D771-7147-B0E0-2D46590E3D3A}" type="datetimeFigureOut">
               <a:rPr lang="en-US" smtClean="0"/>
-              <a:t>5/9/16</a:t>
+              <a:t>5/10/16</a:t>
             </a:fld>
             <a:endParaRPr lang="en-US"/>
           </a:p>
@@ -3645,7 +3748,7 @@
         </p:nvSpPr>
         <p:spPr>
           <a:xfrm>
-            <a:off x="3124200" y="6356350"/>
+            <a:off x="3124200" y="6356353"/>
             <a:ext cx="2895600" cy="365125"/>
           </a:xfrm>
           <a:prstGeom prst="rect">
@@ -3682,7 +3785,7 @@
         </p:nvSpPr>
         <p:spPr>
           <a:xfrm>
-            <a:off x="6553200" y="6356350"/>
+            <a:off x="6553200" y="6356353"/>
             <a:ext cx="2133600" cy="365125"/>
           </a:xfrm>
           <a:prstGeom prst="rect">
@@ -4032,7 +4135,7 @@
         </p:blipFill>
         <p:spPr>
           <a:xfrm>
-            <a:off x="6065075" y="12957"/>
+            <a:off x="6065079" y="12957"/>
             <a:ext cx="3078925" cy="3078925"/>
           </a:xfrm>
           <a:prstGeom prst="rect">
@@ -4134,7 +4237,7 @@
         </p:blipFill>
         <p:spPr>
           <a:xfrm>
-            <a:off x="0" y="5210536"/>
+            <a:off x="4" y="5210536"/>
             <a:ext cx="5191753" cy="1687320"/>
           </a:xfrm>
           <a:prstGeom prst="rect">
@@ -4310,6 +4413,36 @@
           </a:p>
         </p:txBody>
       </p:sp>
+      <p:pic>
+        <p:nvPicPr>
+          <p:cNvPr id="4" name="Picture 3" descr="Gear-001-300px.png"/>
+          <p:cNvPicPr>
+            <a:picLocks noChangeAspect="1"/>
+          </p:cNvPicPr>
+          <p:nvPr/>
+        </p:nvPicPr>
+        <p:blipFill>
+          <a:blip r:embed="rId3">
+            <a:extLst>
+              <a:ext uri="{28A0092B-C50C-407E-A947-70E740481C1C}">
+                <a14:useLocalDpi xmlns:a14="http://schemas.microsoft.com/office/drawing/2010/main" val="0"/>
+              </a:ext>
+            </a:extLst>
+          </a:blip>
+          <a:stretch>
+            <a:fillRect/>
+          </a:stretch>
+        </p:blipFill>
+        <p:spPr>
+          <a:xfrm>
+            <a:off x="8305880" y="6053945"/>
+            <a:ext cx="804057" cy="804057"/>
+          </a:xfrm>
+          <a:prstGeom prst="rect">
+            <a:avLst/>
+          </a:prstGeom>
+        </p:spPr>
+      </p:pic>
     </p:spTree>
     <p:extLst>
       <p:ext uri="{BB962C8B-B14F-4D97-AF65-F5344CB8AC3E}">
@@ -4365,21 +4498,127 @@
             <p:ph type="title"/>
           </p:nvPr>
         </p:nvSpPr>
-        <p:spPr>
-          <a:xfrm>
-            <a:off x="457200" y="2831711"/>
-            <a:ext cx="8229600" cy="1143000"/>
-          </a:xfrm>
-        </p:spPr>
+        <p:spPr/>
+        <p:txBody>
+          <a:bodyPr/>
+          <a:lstStyle/>
+          <a:p>
+            <a:r>
+              <a:rPr lang="en-US" dirty="0" smtClean="0"/>
+              <a:t>Tasks Available</a:t>
+            </a:r>
+            <a:endParaRPr lang="en-US" dirty="0"/>
+          </a:p>
+        </p:txBody>
+      </p:sp>
+      <p:sp>
+        <p:nvSpPr>
+          <p:cNvPr id="3" name="Content Placeholder 2"/>
+          <p:cNvSpPr>
+            <a:spLocks noGrp="1"/>
+          </p:cNvSpPr>
+          <p:nvPr>
+            <p:ph idx="1"/>
+          </p:nvPr>
+        </p:nvSpPr>
+        <p:spPr/>
         <p:txBody>
           <a:bodyPr>
-            <a:normAutofit/>
+            <a:normAutofit lnSpcReduction="10000"/>
           </a:bodyPr>
           <a:lstStyle/>
           <a:p>
             <a:r>
               <a:rPr lang="en-US" dirty="0" smtClean="0"/>
-              <a:t>Demo Time!</a:t>
+              <a:t>Spark-client</a:t>
+            </a:r>
+          </a:p>
+          <a:p>
+            <a:r>
+              <a:rPr lang="en-US" dirty="0" smtClean="0"/>
+              <a:t>Spark-cluster</a:t>
+            </a:r>
+          </a:p>
+          <a:p>
+            <a:r>
+              <a:rPr lang="en-US" dirty="0" smtClean="0"/>
+              <a:t>Spark-Yarn</a:t>
+            </a:r>
+          </a:p>
+          <a:p>
+            <a:r>
+              <a:rPr lang="en-US" dirty="0" err="1" smtClean="0"/>
+              <a:t>Sqoop</a:t>
+            </a:r>
+            <a:r>
+              <a:rPr lang="en-US" dirty="0" smtClean="0"/>
+              <a:t>-Tool</a:t>
+            </a:r>
+          </a:p>
+          <a:p>
+            <a:r>
+              <a:rPr lang="en-US" dirty="0" err="1" smtClean="0"/>
+              <a:t>Sqoop</a:t>
+            </a:r>
+            <a:r>
+              <a:rPr lang="en-US" dirty="0" smtClean="0"/>
+              <a:t>-Job</a:t>
+            </a:r>
+          </a:p>
+          <a:p>
+            <a:r>
+              <a:rPr lang="en-US" dirty="0" err="1" smtClean="0"/>
+              <a:t>Jdbc-hdfs</a:t>
+            </a:r>
+            <a:r>
+              <a:rPr lang="en-US" dirty="0" smtClean="0"/>
+              <a:t>*</a:t>
+            </a:r>
+          </a:p>
+          <a:p>
+            <a:r>
+              <a:rPr lang="en-US" dirty="0" err="1" smtClean="0"/>
+              <a:t>Hdfs-jdbc</a:t>
+            </a:r>
+            <a:r>
+              <a:rPr lang="en-US" dirty="0" smtClean="0"/>
+              <a:t>*</a:t>
+            </a:r>
+          </a:p>
+          <a:p>
+            <a:r>
+              <a:rPr lang="en-US" dirty="0" smtClean="0"/>
+              <a:t>Among others *</a:t>
+            </a:r>
+            <a:endParaRPr lang="en-US" dirty="0"/>
+          </a:p>
+        </p:txBody>
+      </p:sp>
+      <p:sp>
+        <p:nvSpPr>
+          <p:cNvPr id="4" name="TextBox 3"/>
+          <p:cNvSpPr txBox="1"/>
+          <p:nvPr/>
+        </p:nvSpPr>
+        <p:spPr>
+          <a:xfrm>
+            <a:off x="226157" y="6373269"/>
+            <a:ext cx="1586905" cy="369332"/>
+          </a:xfrm>
+          <a:prstGeom prst="rect">
+            <a:avLst/>
+          </a:prstGeom>
+          <a:noFill/>
+        </p:spPr>
+        <p:txBody>
+          <a:bodyPr wrap="none" rtlCol="0">
+            <a:spAutoFit/>
+          </a:bodyPr>
+          <a:lstStyle/>
+          <a:p>
+            <a:r>
+              <a:rPr lang="en-US" dirty="0" smtClean="0"/>
+              <a:t>* Coming Soon</a:t>
             </a:r>
             <a:endParaRPr lang="en-US" dirty="0"/>
           </a:p>
@@ -4387,7 +4626,7 @@
       </p:sp>
       <p:pic>
         <p:nvPicPr>
-          <p:cNvPr id="5" name="Picture 4" descr="Gear-001-300px.png"/>
+          <p:cNvPr id="6" name="Picture 5" descr="Gear-001-300px.png"/>
           <p:cNvPicPr>
             <a:picLocks noChangeAspect="1"/>
           </p:cNvPicPr>
@@ -4407,7 +4646,7 @@
         </p:blipFill>
         <p:spPr>
           <a:xfrm>
-            <a:off x="8305876" y="6053942"/>
+            <a:off x="8305880" y="6053945"/>
             <a:ext cx="804057" cy="804057"/>
           </a:xfrm>
           <a:prstGeom prst="rect">
@@ -4418,7 +4657,7 @@
     </p:spTree>
     <p:extLst>
       <p:ext uri="{BB962C8B-B14F-4D97-AF65-F5344CB8AC3E}">
-        <p14:creationId xmlns:p14="http://schemas.microsoft.com/office/powerpoint/2010/main" val="2293327123"/>
+        <p14:creationId xmlns:p14="http://schemas.microsoft.com/office/powerpoint/2010/main" val="2255138701"/>
       </p:ext>
     </p:extLst>
   </p:cSld>
@@ -4470,6 +4709,111 @@
             <p:ph type="title"/>
           </p:nvPr>
         </p:nvSpPr>
+        <p:spPr>
+          <a:xfrm>
+            <a:off x="457200" y="2831711"/>
+            <a:ext cx="8229600" cy="1143000"/>
+          </a:xfrm>
+        </p:spPr>
+        <p:txBody>
+          <a:bodyPr>
+            <a:normAutofit/>
+          </a:bodyPr>
+          <a:lstStyle/>
+          <a:p>
+            <a:r>
+              <a:rPr lang="en-US" dirty="0" smtClean="0"/>
+              <a:t>Demo Time!</a:t>
+            </a:r>
+            <a:endParaRPr lang="en-US" dirty="0"/>
+          </a:p>
+        </p:txBody>
+      </p:sp>
+      <p:pic>
+        <p:nvPicPr>
+          <p:cNvPr id="5" name="Picture 4" descr="Gear-001-300px.png"/>
+          <p:cNvPicPr>
+            <a:picLocks noChangeAspect="1"/>
+          </p:cNvPicPr>
+          <p:nvPr/>
+        </p:nvPicPr>
+        <p:blipFill>
+          <a:blip r:embed="rId2">
+            <a:extLst>
+              <a:ext uri="{28A0092B-C50C-407E-A947-70E740481C1C}">
+                <a14:useLocalDpi xmlns:a14="http://schemas.microsoft.com/office/drawing/2010/main" val="0"/>
+              </a:ext>
+            </a:extLst>
+          </a:blip>
+          <a:stretch>
+            <a:fillRect/>
+          </a:stretch>
+        </p:blipFill>
+        <p:spPr>
+          <a:xfrm>
+            <a:off x="8305880" y="6053945"/>
+            <a:ext cx="804057" cy="804057"/>
+          </a:xfrm>
+          <a:prstGeom prst="rect">
+            <a:avLst/>
+          </a:prstGeom>
+        </p:spPr>
+      </p:pic>
+    </p:spTree>
+    <p:extLst>
+      <p:ext uri="{BB962C8B-B14F-4D97-AF65-F5344CB8AC3E}">
+        <p14:creationId xmlns:p14="http://schemas.microsoft.com/office/powerpoint/2010/main" val="2293327123"/>
+      </p:ext>
+    </p:extLst>
+  </p:cSld>
+  <p:clrMapOvr>
+    <a:masterClrMapping/>
+  </p:clrMapOvr>
+  <mc:AlternateContent xmlns:mc="http://schemas.openxmlformats.org/markup-compatibility/2006" xmlns:p14="http://schemas.microsoft.com/office/powerpoint/2010/main">
+    <mc:Choice Requires="p14">
+      <p:transition spd="slow" p14:dur="2000"/>
+    </mc:Choice>
+    <mc:Fallback xmlns="">
+      <p:transition xmlns:p14="http://schemas.microsoft.com/office/powerpoint/2010/main" spd="slow"/>
+    </mc:Fallback>
+  </mc:AlternateContent>
+  <p:timing>
+    <p:tnLst>
+      <p:par>
+        <p:cTn xmlns:p14="http://schemas.microsoft.com/office/powerpoint/2010/main" id="1" dur="indefinite" restart="never" nodeType="tmRoot"/>
+      </p:par>
+    </p:tnLst>
+  </p:timing>
+</p:sld>
+</file>
+
+<file path=ppt/slides/slide13.xml><?xml version="1.0" encoding="utf-8"?>
+<p:sld xmlns:a="http://schemas.openxmlformats.org/drawingml/2006/main" xmlns:r="http://schemas.openxmlformats.org/officeDocument/2006/relationships" xmlns:p="http://schemas.openxmlformats.org/presentationml/2006/main">
+  <p:cSld>
+    <p:spTree>
+      <p:nvGrpSpPr>
+        <p:cNvPr id="1" name=""/>
+        <p:cNvGrpSpPr/>
+        <p:nvPr/>
+      </p:nvGrpSpPr>
+      <p:grpSpPr>
+        <a:xfrm>
+          <a:off x="0" y="0"/>
+          <a:ext cx="0" cy="0"/>
+          <a:chOff x="0" y="0"/>
+          <a:chExt cx="0" cy="0"/>
+        </a:xfrm>
+      </p:grpSpPr>
+      <p:sp>
+        <p:nvSpPr>
+          <p:cNvPr id="2" name="Title 1"/>
+          <p:cNvSpPr>
+            <a:spLocks noGrp="1"/>
+          </p:cNvSpPr>
+          <p:nvPr>
+            <p:ph type="title"/>
+          </p:nvPr>
+        </p:nvSpPr>
         <p:spPr/>
         <p:txBody>
           <a:bodyPr/>
@@ -4501,7 +4845,7 @@
         </p:blipFill>
         <p:spPr>
           <a:xfrm>
-            <a:off x="5144826" y="3251875"/>
+            <a:off x="5144826" y="3251877"/>
             <a:ext cx="914801" cy="302801"/>
           </a:xfrm>
           <a:prstGeom prst="rect">
@@ -4520,8 +4864,8 @@
         </p:nvSpPr>
         <p:spPr>
           <a:xfrm>
-            <a:off x="1310626" y="2965126"/>
-            <a:ext cx="1013901" cy="1159495"/>
+            <a:off x="1310630" y="2965128"/>
+            <a:ext cx="1013901" cy="1159496"/>
           </a:xfrm>
           <a:prstGeom prst="rect">
             <a:avLst/>
@@ -4582,7 +4926,7 @@
         </p:nvSpPr>
         <p:spPr>
           <a:xfrm>
-            <a:off x="6487127" y="2963875"/>
+            <a:off x="6487130" y="2963876"/>
             <a:ext cx="1229721" cy="1160746"/>
           </a:xfrm>
           <a:prstGeom prst="rect">
@@ -4646,7 +4990,7 @@
         </p:nvSpPr>
         <p:spPr>
           <a:xfrm>
-            <a:off x="3817726" y="2963875"/>
+            <a:off x="3817726" y="2963876"/>
             <a:ext cx="1013900" cy="1160746"/>
           </a:xfrm>
           <a:prstGeom prst="rect">
@@ -4720,7 +5064,7 @@
         </p:blipFill>
         <p:spPr>
           <a:xfrm>
-            <a:off x="2677226" y="3251875"/>
+            <a:off x="2677230" y="3251877"/>
             <a:ext cx="914801" cy="302801"/>
           </a:xfrm>
           <a:prstGeom prst="rect">
@@ -4927,7 +5271,7 @@
         </p:nvSpPr>
         <p:spPr>
           <a:xfrm>
-            <a:off x="762207" y="4690308"/>
+            <a:off x="762211" y="4690310"/>
             <a:ext cx="1651001" cy="812801"/>
           </a:xfrm>
           <a:prstGeom prst="wedgeEllipseCallout">
@@ -4998,7 +5342,7 @@
         </p:nvSpPr>
         <p:spPr>
           <a:xfrm>
-            <a:off x="6566107" y="4690308"/>
+            <a:off x="6566111" y="4690310"/>
             <a:ext cx="1651001" cy="812801"/>
           </a:xfrm>
           <a:prstGeom prst="wedgeEllipseCallout">
@@ -5068,7 +5412,7 @@
         </p:nvSpPr>
         <p:spPr>
           <a:xfrm>
-            <a:off x="3886407" y="4508990"/>
+            <a:off x="3886411" y="4508993"/>
             <a:ext cx="1724203" cy="812801"/>
           </a:xfrm>
           <a:prstGeom prst="wedgeEllipseCallout">
@@ -5250,7 +5594,7 @@
         </p:blipFill>
         <p:spPr>
           <a:xfrm>
-            <a:off x="8305876" y="6053942"/>
+            <a:off x="8305880" y="6053945"/>
             <a:ext cx="804057" cy="804057"/>
           </a:xfrm>
           <a:prstGeom prst="rect">
@@ -5280,8 +5624,8 @@
         </p:blipFill>
         <p:spPr>
           <a:xfrm>
-            <a:off x="7386147" y="6053942"/>
-            <a:ext cx="900545" cy="838848"/>
+            <a:off x="7386151" y="6053944"/>
+            <a:ext cx="900545" cy="838849"/>
           </a:xfrm>
           <a:prstGeom prst="rect">
             <a:avLst/>
@@ -5316,7 +5660,7 @@
 </p:sld>
 </file>
 
-<file path=ppt/slides/slide13.xml><?xml version="1.0" encoding="utf-8"?>
+<file path=ppt/slides/slide14.xml><?xml version="1.0" encoding="utf-8"?>
 <p:sld xmlns:a="http://schemas.openxmlformats.org/drawingml/2006/main" xmlns:r="http://schemas.openxmlformats.org/officeDocument/2006/relationships" xmlns:p="http://schemas.openxmlformats.org/presentationml/2006/main">
   <p:cSld>
     <p:spTree>
@@ -5378,7 +5722,7 @@
         </p:blipFill>
         <p:spPr>
           <a:xfrm>
-            <a:off x="8305876" y="6053942"/>
+            <a:off x="8305880" y="6053945"/>
             <a:ext cx="804057" cy="804057"/>
           </a:xfrm>
           <a:prstGeom prst="rect">
@@ -5408,8 +5752,8 @@
         </p:blipFill>
         <p:spPr>
           <a:xfrm>
-            <a:off x="7386147" y="6053942"/>
-            <a:ext cx="900545" cy="838848"/>
+            <a:off x="7386151" y="6053944"/>
+            <a:ext cx="900545" cy="838849"/>
           </a:xfrm>
           <a:prstGeom prst="rect">
             <a:avLst/>
@@ -5434,7 +5778,7 @@
         </p:blipFill>
         <p:spPr>
           <a:xfrm>
-            <a:off x="5144826" y="3251875"/>
+            <a:off x="5144826" y="3251877"/>
             <a:ext cx="914801" cy="302801"/>
           </a:xfrm>
           <a:prstGeom prst="rect">
@@ -5453,8 +5797,8 @@
         </p:nvSpPr>
         <p:spPr>
           <a:xfrm>
-            <a:off x="1310626" y="2965126"/>
-            <a:ext cx="1013901" cy="1159495"/>
+            <a:off x="1310630" y="2965128"/>
+            <a:ext cx="1013901" cy="1159496"/>
           </a:xfrm>
           <a:prstGeom prst="rect">
             <a:avLst/>
@@ -5515,7 +5859,7 @@
         </p:nvSpPr>
         <p:spPr>
           <a:xfrm>
-            <a:off x="6487127" y="2963875"/>
+            <a:off x="6487130" y="2963876"/>
             <a:ext cx="1229721" cy="1160746"/>
           </a:xfrm>
           <a:prstGeom prst="rect">
@@ -5579,7 +5923,7 @@
         </p:nvSpPr>
         <p:spPr>
           <a:xfrm>
-            <a:off x="3817726" y="2963875"/>
+            <a:off x="3817726" y="2963876"/>
             <a:ext cx="1013900" cy="1160746"/>
           </a:xfrm>
           <a:prstGeom prst="rect">
@@ -5653,7 +5997,7 @@
         </p:blipFill>
         <p:spPr>
           <a:xfrm>
-            <a:off x="2677226" y="3251875"/>
+            <a:off x="2677230" y="3251877"/>
             <a:ext cx="914801" cy="302801"/>
           </a:xfrm>
           <a:prstGeom prst="rect">
@@ -5860,7 +6204,7 @@
         </p:nvSpPr>
         <p:spPr>
           <a:xfrm>
-            <a:off x="762207" y="4690308"/>
+            <a:off x="762211" y="4690310"/>
             <a:ext cx="1651001" cy="812801"/>
           </a:xfrm>
           <a:prstGeom prst="wedgeEllipseCallout">
@@ -5931,7 +6275,7 @@
         </p:nvSpPr>
         <p:spPr>
           <a:xfrm>
-            <a:off x="6566107" y="4690308"/>
+            <a:off x="6566111" y="4690310"/>
             <a:ext cx="1651001" cy="812801"/>
           </a:xfrm>
           <a:prstGeom prst="wedgeEllipseCallout">
@@ -6001,7 +6345,7 @@
         </p:nvSpPr>
         <p:spPr>
           <a:xfrm>
-            <a:off x="3886407" y="4508990"/>
+            <a:off x="3886411" y="4508993"/>
             <a:ext cx="1724203" cy="812801"/>
           </a:xfrm>
           <a:prstGeom prst="wedgeEllipseCallout">
@@ -6163,217 +6507,6 @@
 </p:sld>
 </file>
 
-<file path=ppt/slides/slide14.xml><?xml version="1.0" encoding="utf-8"?>
-<p:sld xmlns:a="http://schemas.openxmlformats.org/drawingml/2006/main" xmlns:r="http://schemas.openxmlformats.org/officeDocument/2006/relationships" xmlns:p="http://schemas.openxmlformats.org/presentationml/2006/main">
-  <p:cSld>
-    <p:spTree>
-      <p:nvGrpSpPr>
-        <p:cNvPr id="1" name=""/>
-        <p:cNvGrpSpPr/>
-        <p:nvPr/>
-      </p:nvGrpSpPr>
-      <p:grpSpPr>
-        <a:xfrm>
-          <a:off x="0" y="0"/>
-          <a:ext cx="0" cy="0"/>
-          <a:chOff x="0" y="0"/>
-          <a:chExt cx="0" cy="0"/>
-        </a:xfrm>
-      </p:grpSpPr>
-      <p:sp>
-        <p:nvSpPr>
-          <p:cNvPr id="2" name="Title 1"/>
-          <p:cNvSpPr>
-            <a:spLocks noGrp="1"/>
-          </p:cNvSpPr>
-          <p:nvPr>
-            <p:ph type="title"/>
-          </p:nvPr>
-        </p:nvSpPr>
-        <p:spPr/>
-        <p:txBody>
-          <a:bodyPr/>
-          <a:lstStyle/>
-          <a:p>
-            <a:r>
-              <a:rPr lang="en-US" dirty="0" smtClean="0"/>
-              <a:t>Tasks Available</a:t>
-            </a:r>
-            <a:endParaRPr lang="en-US" dirty="0"/>
-          </a:p>
-        </p:txBody>
-      </p:sp>
-      <p:sp>
-        <p:nvSpPr>
-          <p:cNvPr id="3" name="Content Placeholder 2"/>
-          <p:cNvSpPr>
-            <a:spLocks noGrp="1"/>
-          </p:cNvSpPr>
-          <p:nvPr>
-            <p:ph idx="1"/>
-          </p:nvPr>
-        </p:nvSpPr>
-        <p:spPr/>
-        <p:txBody>
-          <a:bodyPr>
-            <a:normAutofit lnSpcReduction="10000"/>
-          </a:bodyPr>
-          <a:lstStyle/>
-          <a:p>
-            <a:r>
-              <a:rPr lang="en-US" dirty="0" smtClean="0"/>
-              <a:t>Spark-client</a:t>
-            </a:r>
-          </a:p>
-          <a:p>
-            <a:r>
-              <a:rPr lang="en-US" dirty="0" smtClean="0"/>
-              <a:t>Spark-cluster</a:t>
-            </a:r>
-          </a:p>
-          <a:p>
-            <a:r>
-              <a:rPr lang="en-US" dirty="0" smtClean="0"/>
-              <a:t>Spark-Yarn</a:t>
-            </a:r>
-          </a:p>
-          <a:p>
-            <a:r>
-              <a:rPr lang="en-US" dirty="0" err="1" smtClean="0"/>
-              <a:t>Sqoop</a:t>
-            </a:r>
-            <a:r>
-              <a:rPr lang="en-US" dirty="0" smtClean="0"/>
-              <a:t>-Tool</a:t>
-            </a:r>
-          </a:p>
-          <a:p>
-            <a:r>
-              <a:rPr lang="en-US" dirty="0" err="1" smtClean="0"/>
-              <a:t>Sqoop</a:t>
-            </a:r>
-            <a:r>
-              <a:rPr lang="en-US" dirty="0" smtClean="0"/>
-              <a:t>-Job</a:t>
-            </a:r>
-          </a:p>
-          <a:p>
-            <a:r>
-              <a:rPr lang="en-US" dirty="0" err="1" smtClean="0"/>
-              <a:t>Jdbc-hdfs</a:t>
-            </a:r>
-            <a:r>
-              <a:rPr lang="en-US" dirty="0" smtClean="0"/>
-              <a:t>*</a:t>
-            </a:r>
-          </a:p>
-          <a:p>
-            <a:r>
-              <a:rPr lang="en-US" dirty="0" err="1" smtClean="0"/>
-              <a:t>Hdfs-jdbc</a:t>
-            </a:r>
-            <a:r>
-              <a:rPr lang="en-US" dirty="0" smtClean="0"/>
-              <a:t>*</a:t>
-            </a:r>
-          </a:p>
-          <a:p>
-            <a:r>
-              <a:rPr lang="en-US" dirty="0" smtClean="0"/>
-              <a:t>Among others *</a:t>
-            </a:r>
-            <a:endParaRPr lang="en-US" dirty="0"/>
-          </a:p>
-        </p:txBody>
-      </p:sp>
-      <p:sp>
-        <p:nvSpPr>
-          <p:cNvPr id="4" name="TextBox 3"/>
-          <p:cNvSpPr txBox="1"/>
-          <p:nvPr/>
-        </p:nvSpPr>
-        <p:spPr>
-          <a:xfrm>
-            <a:off x="226153" y="6373269"/>
-            <a:ext cx="1586905" cy="369332"/>
-          </a:xfrm>
-          <a:prstGeom prst="rect">
-            <a:avLst/>
-          </a:prstGeom>
-          <a:noFill/>
-        </p:spPr>
-        <p:txBody>
-          <a:bodyPr wrap="none" rtlCol="0">
-            <a:spAutoFit/>
-          </a:bodyPr>
-          <a:lstStyle/>
-          <a:p>
-            <a:r>
-              <a:rPr lang="en-US" dirty="0" smtClean="0"/>
-              <a:t>* Coming Soon</a:t>
-            </a:r>
-            <a:endParaRPr lang="en-US" dirty="0"/>
-          </a:p>
-        </p:txBody>
-      </p:sp>
-      <p:pic>
-        <p:nvPicPr>
-          <p:cNvPr id="6" name="Picture 5" descr="Gear-001-300px.png"/>
-          <p:cNvPicPr>
-            <a:picLocks noChangeAspect="1"/>
-          </p:cNvPicPr>
-          <p:nvPr/>
-        </p:nvPicPr>
-        <p:blipFill>
-          <a:blip r:embed="rId2">
-            <a:extLst>
-              <a:ext uri="{28A0092B-C50C-407E-A947-70E740481C1C}">
-                <a14:useLocalDpi xmlns:a14="http://schemas.microsoft.com/office/drawing/2010/main" val="0"/>
-              </a:ext>
-            </a:extLst>
-          </a:blip>
-          <a:stretch>
-            <a:fillRect/>
-          </a:stretch>
-        </p:blipFill>
-        <p:spPr>
-          <a:xfrm>
-            <a:off x="8305876" y="6053942"/>
-            <a:ext cx="804057" cy="804057"/>
-          </a:xfrm>
-          <a:prstGeom prst="rect">
-            <a:avLst/>
-          </a:prstGeom>
-        </p:spPr>
-      </p:pic>
-    </p:spTree>
-    <p:extLst>
-      <p:ext uri="{BB962C8B-B14F-4D97-AF65-F5344CB8AC3E}">
-        <p14:creationId xmlns:p14="http://schemas.microsoft.com/office/powerpoint/2010/main" val="2255138701"/>
-      </p:ext>
-    </p:extLst>
-  </p:cSld>
-  <p:clrMapOvr>
-    <a:masterClrMapping/>
-  </p:clrMapOvr>
-  <mc:AlternateContent xmlns:mc="http://schemas.openxmlformats.org/markup-compatibility/2006" xmlns:p14="http://schemas.microsoft.com/office/powerpoint/2010/main">
-    <mc:Choice Requires="p14">
-      <p:transition spd="slow" p14:dur="2000"/>
-    </mc:Choice>
-    <mc:Fallback xmlns="">
-      <p:transition xmlns:p14="http://schemas.microsoft.com/office/powerpoint/2010/main" spd="slow"/>
-    </mc:Fallback>
-  </mc:AlternateContent>
-  <p:timing>
-    <p:tnLst>
-      <p:par>
-        <p:cTn xmlns:p14="http://schemas.microsoft.com/office/powerpoint/2010/main" id="1" dur="indefinite" restart="never" nodeType="tmRoot"/>
-      </p:par>
-    </p:tnLst>
-  </p:timing>
-</p:sld>
-</file>
-
 <file path=ppt/slides/slide15.xml><?xml version="1.0" encoding="utf-8"?>
 <p:sld xmlns:a="http://schemas.openxmlformats.org/drawingml/2006/main" xmlns:r="http://schemas.openxmlformats.org/officeDocument/2006/relationships" xmlns:p="http://schemas.openxmlformats.org/presentationml/2006/main">
   <p:cSld>
@@ -6481,8 +6614,8 @@
         </p:blipFill>
         <p:spPr>
           <a:xfrm>
-            <a:off x="8148596" y="6053942"/>
-            <a:ext cx="995403" cy="995403"/>
+            <a:off x="8148600" y="6053942"/>
+            <a:ext cx="995403" cy="995404"/>
           </a:xfrm>
           <a:prstGeom prst="rect">
             <a:avLst/>
@@ -6575,7 +6708,7 @@
         </p:nvSpPr>
         <p:spPr>
           <a:xfrm>
-            <a:off x="300636" y="2906664"/>
+            <a:off x="300636" y="2906666"/>
             <a:ext cx="1699958" cy="914400"/>
           </a:xfrm>
           <a:prstGeom prst="roundRect">
@@ -6802,7 +6935,7 @@
         </p:nvSpPr>
         <p:spPr>
           <a:xfrm>
-            <a:off x="2075457" y="2715319"/>
+            <a:off x="2075457" y="2715322"/>
             <a:ext cx="1741658" cy="646331"/>
           </a:xfrm>
           <a:prstGeom prst="rect">
@@ -6838,7 +6971,7 @@
         </p:nvSpPr>
         <p:spPr>
           <a:xfrm>
-            <a:off x="5523931" y="3482017"/>
+            <a:off x="5523935" y="3482017"/>
             <a:ext cx="1776035" cy="923330"/>
           </a:xfrm>
           <a:prstGeom prst="rect">
@@ -7055,7 +7188,7 @@
         </p:nvCxnSpPr>
         <p:spPr>
           <a:xfrm>
-            <a:off x="8355854" y="4405347"/>
+            <a:off x="8355858" y="4405347"/>
             <a:ext cx="92027" cy="0"/>
           </a:xfrm>
           <a:prstGeom prst="straightConnector1">
@@ -7088,7 +7221,7 @@
         </p:nvSpPr>
         <p:spPr>
           <a:xfrm>
-            <a:off x="300636" y="1800919"/>
+            <a:off x="300636" y="1800921"/>
             <a:ext cx="1699958" cy="914400"/>
           </a:xfrm>
           <a:prstGeom prst="roundRect">
@@ -7174,8 +7307,8 @@
         </p:nvCxnSpPr>
         <p:spPr>
           <a:xfrm>
-            <a:off x="2000594" y="2258119"/>
-            <a:ext cx="1809950" cy="457200"/>
+            <a:off x="2000594" y="2258118"/>
+            <a:ext cx="1809950" cy="457201"/>
           </a:xfrm>
           <a:prstGeom prst="straightConnector1">
             <a:avLst/>
@@ -7256,8 +7389,8 @@
         </p:blipFill>
         <p:spPr>
           <a:xfrm>
-            <a:off x="8148596" y="6053942"/>
-            <a:ext cx="995403" cy="995403"/>
+            <a:off x="8148600" y="6053942"/>
+            <a:ext cx="995403" cy="995404"/>
           </a:xfrm>
           <a:prstGeom prst="rect">
             <a:avLst/>
@@ -7286,8 +7419,8 @@
         </p:blipFill>
         <p:spPr>
           <a:xfrm>
-            <a:off x="7211765" y="6053942"/>
-            <a:ext cx="900545" cy="838848"/>
+            <a:off x="7211769" y="6053944"/>
+            <a:ext cx="900545" cy="838849"/>
           </a:xfrm>
           <a:prstGeom prst="rect">
             <a:avLst/>
@@ -7384,7 +7517,7 @@
         <p:spPr>
           <a:xfrm>
             <a:off x="27863" y="1504612"/>
-            <a:ext cx="9144000" cy="4264573"/>
+            <a:ext cx="9144000" cy="4264574"/>
           </a:xfrm>
           <a:solidFill>
             <a:schemeClr val="tx1"/>
@@ -7402,7 +7535,7 @@
             <a:r>
               <a:rPr lang="en-US" sz="3600" dirty="0" smtClean="0">
                 <a:solidFill>
-                  <a:schemeClr val="bg1"/>
+                  <a:srgbClr val="FAC090"/>
                 </a:solidFill>
                 <a:latin typeface="Courier New"/>
                 <a:cs typeface="Courier New"/>
@@ -7506,8 +7639,41 @@
                 <a:latin typeface="Courier New"/>
                 <a:cs typeface="Courier New"/>
               </a:rPr>
-              <a:t>http://localhost:9393/streams/definitions?deploy=false</a:t>
-            </a:r>
+              <a:t>http://localhost:9393/streams/</a:t>
+            </a:r>
+            <a:r>
+              <a:rPr lang="en-US" sz="3600" dirty="0" err="1" smtClean="0">
+                <a:solidFill>
+                  <a:schemeClr val="bg1">
+                    <a:lumMod val="65000"/>
+                  </a:schemeClr>
+                </a:solidFill>
+                <a:latin typeface="Courier New"/>
+                <a:cs typeface="Courier New"/>
+              </a:rPr>
+              <a:t>definitions?deploy</a:t>
+            </a:r>
+            <a:r>
+              <a:rPr lang="en-US" sz="3600" dirty="0" smtClean="0">
+                <a:solidFill>
+                  <a:schemeClr val="bg1">
+                    <a:lumMod val="65000"/>
+                  </a:schemeClr>
+                </a:solidFill>
+                <a:latin typeface="Courier New"/>
+                <a:cs typeface="Courier New"/>
+              </a:rPr>
+              <a:t>=true</a:t>
+            </a:r>
+            <a:endParaRPr lang="en-US" sz="3600" dirty="0" smtClean="0">
+              <a:solidFill>
+                <a:schemeClr val="bg1">
+                  <a:lumMod val="65000"/>
+                </a:schemeClr>
+              </a:solidFill>
+              <a:latin typeface="Courier New"/>
+              <a:cs typeface="Courier New"/>
+            </a:endParaRPr>
           </a:p>
         </p:txBody>
       </p:sp>
@@ -7533,8 +7699,8 @@
         </p:blipFill>
         <p:spPr>
           <a:xfrm>
-            <a:off x="8148596" y="6053942"/>
-            <a:ext cx="995403" cy="995403"/>
+            <a:off x="8148600" y="6053942"/>
+            <a:ext cx="995403" cy="995404"/>
           </a:xfrm>
           <a:prstGeom prst="rect">
             <a:avLst/>
@@ -7563,8 +7729,8 @@
         </p:blipFill>
         <p:spPr>
           <a:xfrm>
-            <a:off x="7211765" y="6053942"/>
-            <a:ext cx="900545" cy="838848"/>
+            <a:off x="7211769" y="6053944"/>
+            <a:ext cx="900545" cy="838849"/>
           </a:xfrm>
           <a:prstGeom prst="rect">
             <a:avLst/>
@@ -7661,7 +7827,7 @@
         <p:spPr>
           <a:xfrm>
             <a:off x="27863" y="1504612"/>
-            <a:ext cx="9144000" cy="4264573"/>
+            <a:ext cx="9144000" cy="4264574"/>
           </a:xfrm>
           <a:solidFill>
             <a:schemeClr val="tx1"/>
@@ -7750,7 +7916,7 @@
             <a:r>
               <a:rPr lang="en-US" sz="3600" dirty="0" smtClean="0">
                 <a:solidFill>
-                  <a:schemeClr val="bg1"/>
+                  <a:srgbClr val="FAC090"/>
                 </a:solidFill>
                 <a:latin typeface="Courier New"/>
                 <a:cs typeface="Courier New"/>
@@ -7760,7 +7926,7 @@
             <a:r>
               <a:rPr lang="en-US" sz="3600" dirty="0" err="1" smtClean="0">
                 <a:solidFill>
-                  <a:schemeClr val="bg1"/>
+                  <a:srgbClr val="FAC090"/>
                 </a:solidFill>
                 <a:latin typeface="Courier New"/>
                 <a:cs typeface="Courier New"/>
@@ -7770,7 +7936,7 @@
             <a:r>
               <a:rPr lang="en-US" sz="3600" dirty="0" smtClean="0">
                 <a:solidFill>
-                  <a:schemeClr val="bg1"/>
+                  <a:srgbClr val="FAC090"/>
                 </a:solidFill>
                 <a:latin typeface="Courier New"/>
                 <a:cs typeface="Courier New"/>
@@ -7805,7 +7971,7 @@
         </p:nvSpPr>
         <p:spPr>
           <a:xfrm>
-            <a:off x="313136" y="2296147"/>
+            <a:off x="313136" y="2296149"/>
             <a:ext cx="3931594" cy="504457"/>
           </a:xfrm>
           <a:prstGeom prst="rect">
@@ -7863,8 +8029,8 @@
         </p:blipFill>
         <p:spPr>
           <a:xfrm>
-            <a:off x="8148596" y="6053942"/>
-            <a:ext cx="995403" cy="995403"/>
+            <a:off x="8148600" y="6053942"/>
+            <a:ext cx="995403" cy="995404"/>
           </a:xfrm>
           <a:prstGeom prst="rect">
             <a:avLst/>
@@ -7893,8 +8059,8 @@
         </p:blipFill>
         <p:spPr>
           <a:xfrm>
-            <a:off x="7211765" y="6053942"/>
-            <a:ext cx="900545" cy="838848"/>
+            <a:off x="7211769" y="6053944"/>
+            <a:ext cx="900545" cy="838849"/>
           </a:xfrm>
           <a:prstGeom prst="rect">
             <a:avLst/>
@@ -7991,7 +8157,7 @@
         <p:spPr>
           <a:xfrm>
             <a:off x="27863" y="1504612"/>
-            <a:ext cx="9144000" cy="4264573"/>
+            <a:ext cx="9144000" cy="4264574"/>
           </a:xfrm>
           <a:solidFill>
             <a:schemeClr val="tx1"/>
@@ -8026,7 +8192,7 @@
             <a:r>
               <a:rPr lang="en-US" sz="3600" dirty="0" smtClean="0">
                 <a:solidFill>
-                  <a:schemeClr val="bg1"/>
+                  <a:srgbClr val="FAC090"/>
                 </a:solidFill>
                 <a:latin typeface="Courier New"/>
                 <a:cs typeface="Courier New"/>
@@ -8036,7 +8202,7 @@
             <a:r>
               <a:rPr lang="en-US" sz="3600" dirty="0" err="1" smtClean="0">
                 <a:solidFill>
-                  <a:schemeClr val="bg1"/>
+                  <a:srgbClr val="FAC090"/>
                 </a:solidFill>
                 <a:latin typeface="Courier New"/>
                 <a:cs typeface="Courier New"/>
@@ -8046,7 +8212,7 @@
             <a:r>
               <a:rPr lang="en-US" sz="3600" dirty="0" smtClean="0">
                 <a:solidFill>
-                  <a:schemeClr val="bg1"/>
+                  <a:srgbClr val="FAC090"/>
                 </a:solidFill>
                 <a:latin typeface="Courier New"/>
                 <a:cs typeface="Courier New"/>
@@ -8116,7 +8282,7 @@
         </p:nvSpPr>
         <p:spPr>
           <a:xfrm>
-            <a:off x="27862" y="2922369"/>
+            <a:off x="27866" y="2922369"/>
             <a:ext cx="9116137" cy="1687320"/>
           </a:xfrm>
           <a:prstGeom prst="rect">
@@ -8174,8 +8340,8 @@
         </p:blipFill>
         <p:spPr>
           <a:xfrm>
-            <a:off x="8148596" y="6053942"/>
-            <a:ext cx="995403" cy="995403"/>
+            <a:off x="8148600" y="6053942"/>
+            <a:ext cx="995403" cy="995404"/>
           </a:xfrm>
           <a:prstGeom prst="rect">
             <a:avLst/>
@@ -8204,8 +8370,8 @@
         </p:blipFill>
         <p:spPr>
           <a:xfrm>
-            <a:off x="7211765" y="6053942"/>
-            <a:ext cx="900545" cy="838848"/>
+            <a:off x="7211769" y="6053944"/>
+            <a:ext cx="900545" cy="838849"/>
           </a:xfrm>
           <a:prstGeom prst="rect">
             <a:avLst/>
@@ -8377,7 +8543,7 @@
         </p:blipFill>
         <p:spPr>
           <a:xfrm>
-            <a:off x="5601651" y="413798"/>
+            <a:off x="5601655" y="413800"/>
             <a:ext cx="1008993" cy="935000"/>
           </a:xfrm>
           <a:prstGeom prst="rect">
@@ -8407,8 +8573,8 @@
         </p:blipFill>
         <p:spPr>
           <a:xfrm>
-            <a:off x="5575911" y="4502749"/>
-            <a:ext cx="611397" cy="611397"/>
+            <a:off x="5575915" y="4502751"/>
+            <a:ext cx="611397" cy="611396"/>
           </a:xfrm>
           <a:prstGeom prst="rect">
             <a:avLst/>
@@ -8470,7 +8636,7 @@
         </p:blipFill>
         <p:spPr>
           <a:xfrm>
-            <a:off x="5601651" y="3928674"/>
+            <a:off x="5601655" y="3928674"/>
             <a:ext cx="504495" cy="504495"/>
           </a:xfrm>
           <a:prstGeom prst="rect">
@@ -8500,8 +8666,8 @@
         </p:blipFill>
         <p:spPr>
           <a:xfrm>
-            <a:off x="8148596" y="6053942"/>
-            <a:ext cx="995403" cy="995403"/>
+            <a:off x="8148600" y="6053942"/>
+            <a:ext cx="995403" cy="995404"/>
           </a:xfrm>
           <a:prstGeom prst="rect">
             <a:avLst/>
@@ -8598,7 +8764,7 @@
         <p:spPr>
           <a:xfrm>
             <a:off x="27863" y="1504612"/>
-            <a:ext cx="9144000" cy="4264573"/>
+            <a:ext cx="9144000" cy="4264574"/>
           </a:xfrm>
           <a:solidFill>
             <a:schemeClr val="tx1"/>
@@ -8686,7 +8852,10 @@
             <a:r>
               <a:rPr lang="en-US" sz="3600" dirty="0" smtClean="0">
                 <a:solidFill>
-                  <a:srgbClr val="FFFFFF"/>
+                  <a:schemeClr val="accent6">
+                    <a:lumMod val="60000"/>
+                    <a:lumOff val="40000"/>
+                  </a:schemeClr>
                 </a:solidFill>
                 <a:latin typeface="Courier New"/>
                 <a:cs typeface="Courier New"/>
@@ -8696,7 +8865,10 @@
             <a:r>
               <a:rPr lang="en-US" sz="3600" dirty="0" err="1" smtClean="0">
                 <a:solidFill>
-                  <a:srgbClr val="FFFFFF"/>
+                  <a:schemeClr val="accent6">
+                    <a:lumMod val="60000"/>
+                    <a:lumOff val="40000"/>
+                  </a:schemeClr>
                 </a:solidFill>
                 <a:latin typeface="Courier New"/>
                 <a:cs typeface="Courier New"/>
@@ -8706,20 +8878,16 @@
             <a:r>
               <a:rPr lang="en-US" sz="3600" dirty="0" smtClean="0">
                 <a:solidFill>
-                  <a:srgbClr val="FFFFFF"/>
+                  <a:schemeClr val="accent6">
+                    <a:lumMod val="60000"/>
+                    <a:lumOff val="40000"/>
+                  </a:schemeClr>
                 </a:solidFill>
                 <a:latin typeface="Courier New"/>
                 <a:cs typeface="Courier New"/>
               </a:rPr>
               <a:t>=true</a:t>
             </a:r>
-            <a:endParaRPr lang="en-US" sz="3600" dirty="0" smtClean="0">
-              <a:solidFill>
-                <a:srgbClr val="FFFFFF"/>
-              </a:solidFill>
-              <a:latin typeface="Courier New"/>
-              <a:cs typeface="Courier New"/>
-            </a:endParaRPr>
           </a:p>
         </p:txBody>
       </p:sp>
@@ -8745,8 +8913,8 @@
         </p:blipFill>
         <p:spPr>
           <a:xfrm>
-            <a:off x="8148596" y="6053942"/>
-            <a:ext cx="995403" cy="995403"/>
+            <a:off x="8148600" y="6053942"/>
+            <a:ext cx="995403" cy="995404"/>
           </a:xfrm>
           <a:prstGeom prst="rect">
             <a:avLst/>
@@ -8775,8 +8943,8 @@
         </p:blipFill>
         <p:spPr>
           <a:xfrm>
-            <a:off x="7211765" y="6053942"/>
-            <a:ext cx="900545" cy="838848"/>
+            <a:off x="7211769" y="6053944"/>
+            <a:ext cx="900545" cy="838849"/>
           </a:xfrm>
           <a:prstGeom prst="rect">
             <a:avLst/>
@@ -8891,7 +9059,7 @@
             <a:r>
               <a:rPr lang="en-US" sz="3500" dirty="0">
                 <a:solidFill>
-                  <a:schemeClr val="bg1"/>
+                  <a:srgbClr val="FAC090"/>
                 </a:solidFill>
                 <a:latin typeface="Courier New"/>
                 <a:cs typeface="Courier New"/>
@@ -8901,7 +9069,7 @@
             <a:r>
               <a:rPr lang="en-US" sz="3500" dirty="0" smtClean="0">
                 <a:solidFill>
-                  <a:schemeClr val="bg1"/>
+                  <a:srgbClr val="FAC090"/>
                 </a:solidFill>
                 <a:latin typeface="Courier New"/>
                 <a:cs typeface="Courier New"/>
@@ -9016,41 +9184,8 @@
                 <a:latin typeface="Courier New"/>
                 <a:cs typeface="Courier New"/>
               </a:rPr>
-              <a:t>| </a:t>
-            </a:r>
-            <a:r>
-              <a:rPr lang="en-US" sz="3500" dirty="0" smtClean="0">
-                <a:solidFill>
-                  <a:schemeClr val="bg1">
-                    <a:lumMod val="65000"/>
-                  </a:schemeClr>
-                </a:solidFill>
-                <a:latin typeface="Courier New"/>
-                <a:cs typeface="Courier New"/>
-              </a:rPr>
-              <a:t>file</a:t>
-            </a:r>
-            <a:r>
-              <a:rPr lang="en-US" sz="3500" dirty="0" smtClean="0">
-                <a:solidFill>
-                  <a:schemeClr val="bg1">
-                    <a:lumMod val="65000"/>
-                  </a:schemeClr>
-                </a:solidFill>
-                <a:latin typeface="Courier New"/>
-                <a:cs typeface="Courier New"/>
-              </a:rPr>
-              <a:t>” --deploy</a:t>
-            </a:r>
-            <a:endParaRPr lang="en-US" sz="3500" dirty="0" smtClean="0">
-              <a:solidFill>
-                <a:schemeClr val="bg1">
-                  <a:lumMod val="65000"/>
-                </a:schemeClr>
-              </a:solidFill>
-              <a:latin typeface="Courier New"/>
-              <a:cs typeface="Courier New"/>
-            </a:endParaRPr>
+              <a:t>| file” --deploy</a:t>
+            </a:r>
           </a:p>
         </p:txBody>
       </p:sp>
@@ -9076,8 +9211,8 @@
         </p:blipFill>
         <p:spPr>
           <a:xfrm>
-            <a:off x="8148596" y="6053942"/>
-            <a:ext cx="995403" cy="995403"/>
+            <a:off x="8148600" y="6053942"/>
+            <a:ext cx="995403" cy="995404"/>
           </a:xfrm>
           <a:prstGeom prst="rect">
             <a:avLst/>
@@ -9106,8 +9241,8 @@
         </p:blipFill>
         <p:spPr>
           <a:xfrm>
-            <a:off x="7211765" y="6053942"/>
-            <a:ext cx="900545" cy="838848"/>
+            <a:off x="7211769" y="6053944"/>
+            <a:ext cx="900545" cy="838849"/>
           </a:xfrm>
           <a:prstGeom prst="rect">
             <a:avLst/>
@@ -9247,7 +9382,7 @@
             <a:r>
               <a:rPr lang="en-US" sz="3500" dirty="0" smtClean="0">
                 <a:solidFill>
-                  <a:schemeClr val="bg1"/>
+                  <a:srgbClr val="FAC090"/>
                 </a:solidFill>
                 <a:latin typeface="Courier New"/>
                 <a:cs typeface="Courier New"/>
@@ -9257,7 +9392,7 @@
             <a:r>
               <a:rPr lang="en-US" sz="3500" dirty="0" err="1" smtClean="0">
                 <a:solidFill>
-                  <a:schemeClr val="bg1"/>
+                  <a:srgbClr val="FAC090"/>
                 </a:solidFill>
                 <a:latin typeface="Courier New"/>
                 <a:cs typeface="Courier New"/>
@@ -9267,7 +9402,7 @@
             <a:r>
               <a:rPr lang="en-US" sz="3500" dirty="0" smtClean="0">
                 <a:solidFill>
-                  <a:schemeClr val="bg1"/>
+                  <a:srgbClr val="FAC090"/>
                 </a:solidFill>
                 <a:latin typeface="Courier New"/>
                 <a:cs typeface="Courier New"/>
@@ -9287,7 +9422,37 @@
                 <a:latin typeface="Courier New"/>
                 <a:cs typeface="Courier New"/>
               </a:rPr>
-              <a:t>--definition “http | </a:t>
+              <a:t>--definition “http | filter </a:t>
+            </a:r>
+            <a:r>
+              <a:rPr lang="en-US" sz="3500" dirty="0">
+                <a:solidFill>
+                  <a:srgbClr val="A6A6A6"/>
+                </a:solidFill>
+                <a:latin typeface="Courier New"/>
+                <a:cs typeface="Courier New"/>
+              </a:rPr>
+              <a:t>expression=</a:t>
+            </a:r>
+            <a:r>
+              <a:rPr lang="en-US" sz="3500" dirty="0" err="1">
+                <a:solidFill>
+                  <a:srgbClr val="A6A6A6"/>
+                </a:solidFill>
+                <a:latin typeface="Courier New"/>
+                <a:cs typeface="Courier New"/>
+              </a:rPr>
+              <a:t>payload.contains</a:t>
+            </a:r>
+            <a:r>
+              <a:rPr lang="en-US" sz="3500" dirty="0">
+                <a:solidFill>
+                  <a:srgbClr val="A6A6A6"/>
+                </a:solidFill>
+                <a:latin typeface="Courier New"/>
+                <a:cs typeface="Courier New"/>
+              </a:rPr>
+              <a:t>('2')  </a:t>
             </a:r>
             <a:r>
               <a:rPr lang="en-US" sz="3500" dirty="0" smtClean="0">
@@ -9297,65 +9462,8 @@
                 <a:latin typeface="Courier New"/>
                 <a:cs typeface="Courier New"/>
               </a:rPr>
-              <a:t>filter </a:t>
-            </a:r>
-            <a:r>
-              <a:rPr lang="en-US" sz="3500" dirty="0">
-                <a:solidFill>
-                  <a:srgbClr val="A6A6A6"/>
-                </a:solidFill>
-                <a:latin typeface="Courier New"/>
-                <a:cs typeface="Courier New"/>
-              </a:rPr>
-              <a:t>expression=</a:t>
-            </a:r>
-            <a:r>
-              <a:rPr lang="en-US" sz="3500" dirty="0" err="1">
-                <a:solidFill>
-                  <a:srgbClr val="A6A6A6"/>
-                </a:solidFill>
-                <a:latin typeface="Courier New"/>
-                <a:cs typeface="Courier New"/>
-              </a:rPr>
-              <a:t>payload.contains</a:t>
-            </a:r>
-            <a:r>
-              <a:rPr lang="en-US" sz="3500" dirty="0">
-                <a:solidFill>
-                  <a:srgbClr val="A6A6A6"/>
-                </a:solidFill>
-                <a:latin typeface="Courier New"/>
-                <a:cs typeface="Courier New"/>
-              </a:rPr>
-              <a:t>('2')  </a:t>
-            </a:r>
-            <a:r>
-              <a:rPr lang="en-US" sz="3500" dirty="0" smtClean="0">
-                <a:solidFill>
-                  <a:srgbClr val="A6A6A6"/>
-                </a:solidFill>
-                <a:latin typeface="Courier New"/>
-                <a:cs typeface="Courier New"/>
-              </a:rPr>
-              <a:t>| file</a:t>
-            </a:r>
-            <a:r>
-              <a:rPr lang="en-US" sz="3500" dirty="0" smtClean="0">
-                <a:solidFill>
-                  <a:srgbClr val="A6A6A6"/>
-                </a:solidFill>
-                <a:latin typeface="Courier New"/>
-                <a:cs typeface="Courier New"/>
-              </a:rPr>
-              <a:t>” --deploy</a:t>
-            </a:r>
-            <a:endParaRPr lang="en-US" sz="3500" dirty="0" smtClean="0">
-              <a:solidFill>
-                <a:srgbClr val="A6A6A6"/>
-              </a:solidFill>
-              <a:latin typeface="Courier New"/>
-              <a:cs typeface="Courier New"/>
-            </a:endParaRPr>
+              <a:t>| file” --deploy</a:t>
+            </a:r>
           </a:p>
         </p:txBody>
       </p:sp>
@@ -9381,8 +9489,8 @@
         </p:blipFill>
         <p:spPr>
           <a:xfrm>
-            <a:off x="8148596" y="6053942"/>
-            <a:ext cx="995403" cy="995403"/>
+            <a:off x="8148600" y="6053942"/>
+            <a:ext cx="995403" cy="995404"/>
           </a:xfrm>
           <a:prstGeom prst="rect">
             <a:avLst/>
@@ -9411,8 +9519,8 @@
         </p:blipFill>
         <p:spPr>
           <a:xfrm>
-            <a:off x="7211765" y="6053942"/>
-            <a:ext cx="900545" cy="838848"/>
+            <a:off x="7211769" y="6053944"/>
+            <a:ext cx="900545" cy="838849"/>
           </a:xfrm>
           <a:prstGeom prst="rect">
             <a:avLst/>
@@ -9508,7 +9616,7 @@
         </p:nvSpPr>
         <p:spPr>
           <a:xfrm>
-            <a:off x="0" y="1504611"/>
+            <a:off x="4" y="1504611"/>
             <a:ext cx="9171863" cy="3626929"/>
           </a:xfrm>
           <a:solidFill>
@@ -9587,100 +9695,53 @@
             <a:r>
               <a:rPr lang="en-US" sz="3500" dirty="0" smtClean="0">
                 <a:solidFill>
-                  <a:schemeClr val="bg1"/>
-                </a:solidFill>
-                <a:latin typeface="Courier New"/>
-                <a:cs typeface="Courier New"/>
-              </a:rPr>
-              <a:t>--definition “http | </a:t>
+                  <a:srgbClr val="FAC090"/>
+                </a:solidFill>
+                <a:latin typeface="Courier New"/>
+                <a:cs typeface="Courier New"/>
+              </a:rPr>
+              <a:t>--definition “http | filter </a:t>
+            </a:r>
+            <a:r>
+              <a:rPr lang="en-US" sz="3500" dirty="0">
+                <a:solidFill>
+                  <a:srgbClr val="FAC090"/>
+                </a:solidFill>
+                <a:latin typeface="Courier New"/>
+                <a:cs typeface="Courier New"/>
+              </a:rPr>
+              <a:t>expression=</a:t>
+            </a:r>
+            <a:r>
+              <a:rPr lang="en-US" sz="3500" dirty="0" err="1">
+                <a:solidFill>
+                  <a:srgbClr val="FAC090"/>
+                </a:solidFill>
+                <a:latin typeface="Courier New"/>
+                <a:cs typeface="Courier New"/>
+              </a:rPr>
+              <a:t>payload.contains</a:t>
+            </a:r>
+            <a:r>
+              <a:rPr lang="en-US" sz="3500" dirty="0">
+                <a:solidFill>
+                  <a:srgbClr val="FAC090"/>
+                </a:solidFill>
+                <a:latin typeface="Courier New"/>
+                <a:cs typeface="Courier New"/>
+              </a:rPr>
+              <a:t>('2') </a:t>
             </a:r>
             <a:r>
               <a:rPr lang="en-US" sz="3500" dirty="0" smtClean="0">
                 <a:solidFill>
-                  <a:schemeClr val="bg1"/>
-                </a:solidFill>
-                <a:latin typeface="Courier New"/>
-                <a:cs typeface="Courier New"/>
-              </a:rPr>
-              <a:t>filter </a:t>
-            </a:r>
-            <a:r>
-              <a:rPr lang="en-US" sz="3500" dirty="0">
-                <a:solidFill>
-                  <a:schemeClr val="bg1"/>
-                </a:solidFill>
-                <a:latin typeface="Courier New"/>
-                <a:cs typeface="Courier New"/>
-              </a:rPr>
-              <a:t>expression=</a:t>
-            </a:r>
-            <a:r>
-              <a:rPr lang="en-US" sz="3500" dirty="0" err="1">
-                <a:solidFill>
-                  <a:schemeClr val="bg1"/>
-                </a:solidFill>
-                <a:latin typeface="Courier New"/>
-                <a:cs typeface="Courier New"/>
-              </a:rPr>
-              <a:t>payload.contains</a:t>
-            </a:r>
-            <a:r>
-              <a:rPr lang="en-US" sz="3500" dirty="0">
-                <a:solidFill>
-                  <a:schemeClr val="bg1"/>
-                </a:solidFill>
-                <a:latin typeface="Courier New"/>
-                <a:cs typeface="Courier New"/>
-              </a:rPr>
-              <a:t>('2') </a:t>
-            </a:r>
-            <a:r>
-              <a:rPr lang="en-US" sz="3500" dirty="0" smtClean="0">
-                <a:solidFill>
-                  <a:schemeClr val="bg1"/>
-                </a:solidFill>
-                <a:latin typeface="Courier New"/>
-                <a:cs typeface="Courier New"/>
-              </a:rPr>
-              <a:t> </a:t>
-            </a:r>
-            <a:r>
-              <a:rPr lang="en-US" sz="3500" dirty="0" smtClean="0">
-                <a:solidFill>
-                  <a:schemeClr val="bg1"/>
-                </a:solidFill>
-                <a:latin typeface="Courier New"/>
-                <a:cs typeface="Courier New"/>
-              </a:rPr>
-              <a:t>| file</a:t>
-            </a:r>
-            <a:r>
-              <a:rPr lang="en-US" sz="3500" dirty="0" smtClean="0">
-                <a:solidFill>
-                  <a:schemeClr val="bg1"/>
-                </a:solidFill>
-                <a:latin typeface="Courier New"/>
-                <a:cs typeface="Courier New"/>
-              </a:rPr>
-              <a:t>” -</a:t>
-            </a:r>
-            <a:r>
-              <a:rPr lang="en-US" sz="3500" smtClean="0">
-                <a:solidFill>
-                  <a:schemeClr val="bg1"/>
-                </a:solidFill>
-                <a:latin typeface="Courier New"/>
-                <a:cs typeface="Courier New"/>
-              </a:rPr>
-              <a:t>-deploy</a:t>
-            </a:r>
-            <a:endParaRPr lang="en-US" sz="3500" dirty="0" smtClean="0">
-              <a:solidFill>
-                <a:schemeClr val="bg1"/>
-              </a:solidFill>
-              <a:latin typeface="Courier New"/>
-              <a:cs typeface="Courier New"/>
-            </a:endParaRPr>
+                  <a:srgbClr val="FAC090"/>
+                </a:solidFill>
+                <a:latin typeface="Courier New"/>
+                <a:cs typeface="Courier New"/>
+              </a:rPr>
+              <a:t> | file” --deploy</a:t>
+            </a:r>
           </a:p>
         </p:txBody>
       </p:sp>
@@ -9706,8 +9767,8 @@
         </p:blipFill>
         <p:spPr>
           <a:xfrm>
-            <a:off x="8148596" y="6053942"/>
-            <a:ext cx="995403" cy="995403"/>
+            <a:off x="8148600" y="6053942"/>
+            <a:ext cx="995403" cy="995404"/>
           </a:xfrm>
           <a:prstGeom prst="rect">
             <a:avLst/>
@@ -9736,8 +9797,8 @@
         </p:blipFill>
         <p:spPr>
           <a:xfrm>
-            <a:off x="7211765" y="6053942"/>
-            <a:ext cx="900545" cy="838848"/>
+            <a:off x="7211769" y="6053944"/>
+            <a:ext cx="900545" cy="838849"/>
           </a:xfrm>
           <a:prstGeom prst="rect">
             <a:avLst/>
@@ -9843,7 +9904,7 @@
         </p:blipFill>
         <p:spPr>
           <a:xfrm>
-            <a:off x="0" y="916600"/>
+            <a:off x="0" y="916599"/>
             <a:ext cx="9144000" cy="3971410"/>
           </a:xfrm>
           <a:prstGeom prst="rect">
@@ -9873,8 +9934,8 @@
         </p:blipFill>
         <p:spPr>
           <a:xfrm>
-            <a:off x="8148596" y="6053942"/>
-            <a:ext cx="995403" cy="995403"/>
+            <a:off x="8148600" y="6053942"/>
+            <a:ext cx="995403" cy="995404"/>
           </a:xfrm>
           <a:prstGeom prst="rect">
             <a:avLst/>
@@ -9903,8 +9964,8 @@
         </p:blipFill>
         <p:spPr>
           <a:xfrm>
-            <a:off x="7211765" y="6053942"/>
-            <a:ext cx="900545" cy="838848"/>
+            <a:off x="7211769" y="6053944"/>
+            <a:ext cx="900545" cy="838849"/>
           </a:xfrm>
           <a:prstGeom prst="rect">
             <a:avLst/>
@@ -10015,8 +10076,8 @@
         </p:blipFill>
         <p:spPr>
           <a:xfrm>
-            <a:off x="8148596" y="6053942"/>
-            <a:ext cx="995403" cy="995403"/>
+            <a:off x="8148600" y="6053942"/>
+            <a:ext cx="995403" cy="995404"/>
           </a:xfrm>
           <a:prstGeom prst="rect">
             <a:avLst/>
@@ -10045,8 +10106,8 @@
         </p:blipFill>
         <p:spPr>
           <a:xfrm>
-            <a:off x="7211765" y="6053942"/>
-            <a:ext cx="900545" cy="838848"/>
+            <a:off x="7211769" y="6053944"/>
+            <a:ext cx="900545" cy="838849"/>
           </a:xfrm>
           <a:prstGeom prst="rect">
             <a:avLst/>
@@ -10133,7 +10194,7 @@
         </p:nvSpPr>
         <p:spPr>
           <a:xfrm>
-            <a:off x="457200" y="1600200"/>
+            <a:off x="457200" y="1600203"/>
             <a:ext cx="8229600" cy="2463685"/>
           </a:xfrm>
         </p:spPr>
@@ -10189,8 +10250,8 @@
         </p:blipFill>
         <p:spPr>
           <a:xfrm>
-            <a:off x="8148596" y="6053942"/>
-            <a:ext cx="995403" cy="995403"/>
+            <a:off x="8148600" y="6053942"/>
+            <a:ext cx="995403" cy="995404"/>
           </a:xfrm>
           <a:prstGeom prst="rect">
             <a:avLst/>
@@ -10292,7 +10353,7 @@
             <a:r>
               <a:rPr lang="en-US" sz="3600" dirty="0" smtClean="0">
                 <a:solidFill>
-                  <a:srgbClr val="FFFFFF"/>
+                  <a:srgbClr val="FAC090"/>
                 </a:solidFill>
                 <a:latin typeface="Courier New"/>
                 <a:cs typeface="Courier New"/>
@@ -10421,8 +10482,8 @@
         </p:blipFill>
         <p:spPr>
           <a:xfrm>
-            <a:off x="8148596" y="6053942"/>
-            <a:ext cx="995403" cy="995403"/>
+            <a:off x="8148600" y="6053942"/>
+            <a:ext cx="995403" cy="995404"/>
           </a:xfrm>
           <a:prstGeom prst="rect">
             <a:avLst/>
@@ -10534,7 +10595,7 @@
             <a:r>
               <a:rPr lang="en-US" sz="3600" dirty="0" smtClean="0">
                 <a:solidFill>
-                  <a:srgbClr val="FFFFFF"/>
+                  <a:srgbClr val="FAC090"/>
                 </a:solidFill>
                 <a:latin typeface="Courier New"/>
                 <a:cs typeface="Courier New"/>
@@ -10544,7 +10605,7 @@
             <a:r>
               <a:rPr lang="en-US" sz="3600" dirty="0" err="1" smtClean="0">
                 <a:solidFill>
-                  <a:srgbClr val="FFFFFF"/>
+                  <a:srgbClr val="FAC090"/>
                 </a:solidFill>
                 <a:latin typeface="Courier New"/>
                 <a:cs typeface="Courier New"/>
@@ -10554,7 +10615,7 @@
             <a:r>
               <a:rPr lang="en-US" sz="3600" dirty="0" smtClean="0">
                 <a:solidFill>
-                  <a:srgbClr val="FFFFFF"/>
+                  <a:srgbClr val="FAC090"/>
                 </a:solidFill>
                 <a:latin typeface="Courier New"/>
                 <a:cs typeface="Courier New"/>
@@ -10637,8 +10698,8 @@
         </p:blipFill>
         <p:spPr>
           <a:xfrm>
-            <a:off x="8148596" y="6053942"/>
-            <a:ext cx="995403" cy="995403"/>
+            <a:off x="8148600" y="6053942"/>
+            <a:ext cx="995403" cy="995404"/>
           </a:xfrm>
           <a:prstGeom prst="rect">
             <a:avLst/>
@@ -10772,7 +10833,7 @@
             <a:r>
               <a:rPr lang="en-US" sz="3600" dirty="0" smtClean="0">
                 <a:solidFill>
-                  <a:schemeClr val="bg1"/>
+                  <a:srgbClr val="FAC090"/>
                 </a:solidFill>
                 <a:latin typeface="Courier New"/>
                 <a:cs typeface="Courier New"/>
@@ -10843,8 +10904,8 @@
         </p:blipFill>
         <p:spPr>
           <a:xfrm>
-            <a:off x="8148596" y="6053942"/>
-            <a:ext cx="995403" cy="995403"/>
+            <a:off x="8148600" y="6053942"/>
+            <a:ext cx="995403" cy="995404"/>
           </a:xfrm>
           <a:prstGeom prst="rect">
             <a:avLst/>
@@ -11011,8 +11072,8 @@
         </p:blipFill>
         <p:spPr>
           <a:xfrm>
-            <a:off x="8148596" y="6053942"/>
-            <a:ext cx="995403" cy="995403"/>
+            <a:off x="8148600" y="6053942"/>
+            <a:ext cx="995403" cy="995404"/>
           </a:xfrm>
           <a:prstGeom prst="rect">
             <a:avLst/>
@@ -11158,7 +11219,7 @@
             <a:r>
               <a:rPr lang="en-US" sz="3600" dirty="0" smtClean="0">
                 <a:solidFill>
-                  <a:srgbClr val="FFFFFF"/>
+                  <a:srgbClr val="FAC090"/>
                 </a:solidFill>
                 <a:latin typeface="Courier New"/>
                 <a:cs typeface="Courier New"/>
@@ -11168,7 +11229,7 @@
             <a:r>
               <a:rPr lang="en-US" sz="3600" dirty="0" err="1" smtClean="0">
                 <a:solidFill>
-                  <a:srgbClr val="FFFFFF"/>
+                  <a:srgbClr val="FAC090"/>
                 </a:solidFill>
                 <a:latin typeface="Courier New"/>
                 <a:cs typeface="Courier New"/>
@@ -11178,7 +11239,7 @@
             <a:r>
               <a:rPr lang="en-US" sz="3600" dirty="0" smtClean="0">
                 <a:solidFill>
-                  <a:srgbClr val="FFFFFF"/>
+                  <a:srgbClr val="FAC090"/>
                 </a:solidFill>
                 <a:latin typeface="Courier New"/>
                 <a:cs typeface="Courier New"/>
@@ -11187,7 +11248,7 @@
             </a:r>
             <a:endParaRPr lang="en-US" sz="3600" dirty="0">
               <a:solidFill>
-                <a:srgbClr val="FFFFFF"/>
+                <a:srgbClr val="FAC090"/>
               </a:solidFill>
               <a:latin typeface="Courier New"/>
               <a:cs typeface="Courier New"/>
@@ -11217,8 +11278,8 @@
         </p:blipFill>
         <p:spPr>
           <a:xfrm>
-            <a:off x="8148596" y="6053942"/>
-            <a:ext cx="995403" cy="995403"/>
+            <a:off x="8148600" y="6053942"/>
+            <a:ext cx="995403" cy="995404"/>
           </a:xfrm>
           <a:prstGeom prst="rect">
             <a:avLst/>
@@ -11349,7 +11410,7 @@
             <a:r>
               <a:rPr lang="en-US" dirty="0" smtClean="0">
                 <a:solidFill>
-                  <a:schemeClr val="bg1"/>
+                  <a:srgbClr val="FAC090"/>
                 </a:solidFill>
                 <a:latin typeface="Courier New"/>
                 <a:cs typeface="Courier New"/>
@@ -11359,7 +11420,7 @@
             <a:r>
               <a:rPr lang="en-US" dirty="0" err="1" smtClean="0">
                 <a:solidFill>
-                  <a:schemeClr val="bg1"/>
+                  <a:srgbClr val="FAC090"/>
                 </a:solidFill>
                 <a:latin typeface="Courier New"/>
                 <a:cs typeface="Courier New"/>
@@ -11369,7 +11430,7 @@
             <a:r>
               <a:rPr lang="en-US" dirty="0" smtClean="0">
                 <a:solidFill>
-                  <a:schemeClr val="bg1"/>
+                  <a:srgbClr val="FAC090"/>
                 </a:solidFill>
                 <a:latin typeface="Courier New"/>
                 <a:cs typeface="Courier New"/>
@@ -11384,7 +11445,7 @@
             <a:r>
               <a:rPr lang="en-US" dirty="0" smtClean="0">
                 <a:solidFill>
-                  <a:schemeClr val="bg1"/>
+                  <a:srgbClr val="FAC090"/>
                 </a:solidFill>
                 <a:latin typeface="Courier New"/>
                 <a:cs typeface="Courier New"/>
@@ -11468,8 +11529,8 @@
         </p:blipFill>
         <p:spPr>
           <a:xfrm>
-            <a:off x="8148596" y="6053942"/>
-            <a:ext cx="995403" cy="995403"/>
+            <a:off x="8148600" y="6053942"/>
+            <a:ext cx="995403" cy="995404"/>
           </a:xfrm>
           <a:prstGeom prst="rect">
             <a:avLst/>
@@ -11498,7 +11559,7 @@
         </p:blipFill>
         <p:spPr>
           <a:xfrm>
-            <a:off x="7257559" y="6053942"/>
+            <a:off x="7257563" y="6053945"/>
             <a:ext cx="804057" cy="804057"/>
           </a:xfrm>
           <a:prstGeom prst="rect">
@@ -11514,7 +11575,7 @@
         </p:nvSpPr>
         <p:spPr>
           <a:xfrm>
-            <a:off x="313136" y="1669927"/>
+            <a:off x="313136" y="1669929"/>
             <a:ext cx="3931594" cy="504457"/>
           </a:xfrm>
           <a:prstGeom prst="rect">
@@ -11643,7 +11704,7 @@
             <a:r>
               <a:rPr lang="en-US" dirty="0">
                 <a:solidFill>
-                  <a:schemeClr val="bg1"/>
+                  <a:srgbClr val="FAC090"/>
                 </a:solidFill>
                 <a:latin typeface="Courier New"/>
                 <a:cs typeface="Courier New"/>
@@ -11653,7 +11714,7 @@
             <a:r>
               <a:rPr lang="en-US" dirty="0" smtClean="0">
                 <a:solidFill>
-                  <a:schemeClr val="bg1"/>
+                  <a:srgbClr val="FAC090"/>
                 </a:solidFill>
                 <a:latin typeface="Courier New"/>
                 <a:cs typeface="Courier New"/>
@@ -11703,7 +11764,7 @@
             <a:r>
               <a:rPr lang="en-US" dirty="0" smtClean="0">
                 <a:solidFill>
-                  <a:schemeClr val="bg1"/>
+                  <a:srgbClr val="FAC090"/>
                 </a:solidFill>
                 <a:latin typeface="Courier New"/>
                 <a:cs typeface="Courier New"/>
@@ -11787,8 +11848,8 @@
         </p:blipFill>
         <p:spPr>
           <a:xfrm>
-            <a:off x="8148596" y="6053942"/>
-            <a:ext cx="995403" cy="995403"/>
+            <a:off x="8148600" y="6053942"/>
+            <a:ext cx="995403" cy="995404"/>
           </a:xfrm>
           <a:prstGeom prst="rect">
             <a:avLst/>
@@ -11817,7 +11878,7 @@
         </p:blipFill>
         <p:spPr>
           <a:xfrm>
-            <a:off x="7257559" y="6053942"/>
+            <a:off x="7257563" y="6053945"/>
             <a:ext cx="804057" cy="804057"/>
           </a:xfrm>
           <a:prstGeom prst="rect">
@@ -11833,7 +11894,7 @@
         </p:nvSpPr>
         <p:spPr>
           <a:xfrm>
-            <a:off x="313136" y="2296147"/>
+            <a:off x="313136" y="2296149"/>
             <a:ext cx="3931594" cy="504457"/>
           </a:xfrm>
           <a:prstGeom prst="rect">
@@ -11962,7 +12023,7 @@
             <a:r>
               <a:rPr lang="en-US" dirty="0">
                 <a:solidFill>
-                  <a:schemeClr val="bg1"/>
+                  <a:srgbClr val="FAC090"/>
                 </a:solidFill>
                 <a:latin typeface="Courier New"/>
                 <a:cs typeface="Courier New"/>
@@ -11972,7 +12033,7 @@
             <a:r>
               <a:rPr lang="en-US" dirty="0" smtClean="0">
                 <a:solidFill>
-                  <a:schemeClr val="bg1"/>
+                  <a:srgbClr val="FAC090"/>
                 </a:solidFill>
                 <a:latin typeface="Courier New"/>
                 <a:cs typeface="Courier New"/>
@@ -11987,7 +12048,7 @@
             <a:r>
               <a:rPr lang="en-US" dirty="0" smtClean="0">
                 <a:solidFill>
-                  <a:schemeClr val="bg1"/>
+                  <a:srgbClr val="FAC090"/>
                 </a:solidFill>
                 <a:latin typeface="Courier New"/>
                 <a:cs typeface="Courier New"/>
@@ -11997,7 +12058,7 @@
             <a:r>
               <a:rPr lang="en-US" dirty="0" err="1" smtClean="0">
                 <a:solidFill>
-                  <a:schemeClr val="bg1"/>
+                  <a:srgbClr val="FAC090"/>
                 </a:solidFill>
                 <a:latin typeface="Courier New"/>
                 <a:cs typeface="Courier New"/>
@@ -12007,7 +12068,7 @@
             <a:r>
               <a:rPr lang="en-US" dirty="0" smtClean="0">
                 <a:solidFill>
-                  <a:schemeClr val="bg1"/>
+                  <a:srgbClr val="FAC090"/>
                 </a:solidFill>
                 <a:latin typeface="Courier New"/>
                 <a:cs typeface="Courier New"/>
@@ -12106,8 +12167,8 @@
         </p:blipFill>
         <p:spPr>
           <a:xfrm>
-            <a:off x="8148596" y="6053942"/>
-            <a:ext cx="995403" cy="995403"/>
+            <a:off x="8148600" y="6053942"/>
+            <a:ext cx="995403" cy="995404"/>
           </a:xfrm>
           <a:prstGeom prst="rect">
             <a:avLst/>
@@ -12136,7 +12197,7 @@
         </p:blipFill>
         <p:spPr>
           <a:xfrm>
-            <a:off x="7257559" y="6053942"/>
+            <a:off x="7257563" y="6053945"/>
             <a:ext cx="804057" cy="804057"/>
           </a:xfrm>
           <a:prstGeom prst="rect">
@@ -12152,7 +12213,7 @@
         </p:nvSpPr>
         <p:spPr>
           <a:xfrm>
-            <a:off x="313135" y="2800604"/>
+            <a:off x="313139" y="2800606"/>
             <a:ext cx="6140941" cy="504457"/>
           </a:xfrm>
           <a:prstGeom prst="rect">
@@ -12380,7 +12441,7 @@
             <a:r>
               <a:rPr lang="en-US" dirty="0" smtClean="0">
                 <a:solidFill>
-                  <a:schemeClr val="bg1"/>
+                  <a:srgbClr val="FAC090"/>
                 </a:solidFill>
                 <a:latin typeface="Courier New"/>
                 <a:cs typeface="Courier New"/>
@@ -12390,7 +12451,7 @@
             <a:r>
               <a:rPr lang="en-US" dirty="0" err="1" smtClean="0">
                 <a:solidFill>
-                  <a:schemeClr val="bg1"/>
+                  <a:srgbClr val="FAC090"/>
                 </a:solidFill>
                 <a:latin typeface="Courier New"/>
                 <a:cs typeface="Courier New"/>
@@ -12399,7 +12460,7 @@
             </a:r>
             <a:endParaRPr lang="en-US" dirty="0">
               <a:solidFill>
-                <a:schemeClr val="bg1"/>
+                <a:srgbClr val="FAC090"/>
               </a:solidFill>
               <a:latin typeface="Courier New"/>
               <a:cs typeface="Courier New"/>
@@ -12429,8 +12490,8 @@
         </p:blipFill>
         <p:spPr>
           <a:xfrm>
-            <a:off x="8148596" y="6053942"/>
-            <a:ext cx="995403" cy="995403"/>
+            <a:off x="8148600" y="6053942"/>
+            <a:ext cx="995403" cy="995404"/>
           </a:xfrm>
           <a:prstGeom prst="rect">
             <a:avLst/>
@@ -12459,7 +12520,7 @@
         </p:blipFill>
         <p:spPr>
           <a:xfrm>
-            <a:off x="7257559" y="6053942"/>
+            <a:off x="7257563" y="6053945"/>
             <a:ext cx="804057" cy="804057"/>
           </a:xfrm>
           <a:prstGeom prst="rect">
@@ -12564,8 +12625,8 @@
         </p:blipFill>
         <p:spPr>
           <a:xfrm>
-            <a:off x="8148596" y="6053942"/>
-            <a:ext cx="995403" cy="995403"/>
+            <a:off x="8148600" y="6053942"/>
+            <a:ext cx="995403" cy="995404"/>
           </a:xfrm>
           <a:prstGeom prst="rect">
             <a:avLst/>
@@ -12594,7 +12655,7 @@
         </p:blipFill>
         <p:spPr>
           <a:xfrm>
-            <a:off x="7296908" y="6053942"/>
+            <a:off x="7296912" y="6053945"/>
             <a:ext cx="804057" cy="804057"/>
           </a:xfrm>
           <a:prstGeom prst="rect">
@@ -12682,7 +12743,7 @@
         </p:nvSpPr>
         <p:spPr>
           <a:xfrm>
-            <a:off x="457200" y="2177143"/>
+            <a:off x="457200" y="2177146"/>
             <a:ext cx="8229600" cy="3435487"/>
           </a:xfrm>
         </p:spPr>
@@ -12854,7 +12915,7 @@
         </p:blipFill>
         <p:spPr>
           <a:xfrm>
-            <a:off x="6799271" y="0"/>
+            <a:off x="6799275" y="3"/>
             <a:ext cx="2162629" cy="2177143"/>
           </a:xfrm>
           <a:prstGeom prst="rect">
@@ -12884,8 +12945,8 @@
         </p:blipFill>
         <p:spPr>
           <a:xfrm>
-            <a:off x="8148596" y="6053942"/>
-            <a:ext cx="995403" cy="995403"/>
+            <a:off x="8148600" y="6053942"/>
+            <a:ext cx="995403" cy="995404"/>
           </a:xfrm>
           <a:prstGeom prst="rect">
             <a:avLst/>
@@ -12914,8 +12975,8 @@
         </p:blipFill>
         <p:spPr>
           <a:xfrm>
-            <a:off x="7211765" y="6053942"/>
-            <a:ext cx="900545" cy="838848"/>
+            <a:off x="7211769" y="6053944"/>
+            <a:ext cx="900545" cy="838849"/>
           </a:xfrm>
           <a:prstGeom prst="rect">
             <a:avLst/>
@@ -12944,7 +13005,7 @@
         </p:blipFill>
         <p:spPr>
           <a:xfrm>
-            <a:off x="6407708" y="6088733"/>
+            <a:off x="6407712" y="6088736"/>
             <a:ext cx="804057" cy="804057"/>
           </a:xfrm>
           <a:prstGeom prst="rect">
@@ -13082,7 +13143,7 @@
         </p:blipFill>
         <p:spPr>
           <a:xfrm>
-            <a:off x="5614518" y="3251875"/>
+            <a:off x="5614522" y="3251877"/>
             <a:ext cx="914801" cy="302801"/>
           </a:xfrm>
           <a:prstGeom prst="rect">
@@ -13101,8 +13162,8 @@
         </p:nvSpPr>
         <p:spPr>
           <a:xfrm>
-            <a:off x="1780318" y="2965126"/>
-            <a:ext cx="1013901" cy="1159495"/>
+            <a:off x="1780322" y="2965128"/>
+            <a:ext cx="1013901" cy="1159496"/>
           </a:xfrm>
           <a:prstGeom prst="rect">
             <a:avLst/>
@@ -13175,7 +13236,7 @@
         </p:nvSpPr>
         <p:spPr>
           <a:xfrm>
-            <a:off x="6956819" y="2963875"/>
+            <a:off x="6956823" y="2963876"/>
             <a:ext cx="1229721" cy="1160746"/>
           </a:xfrm>
           <a:prstGeom prst="rect">
@@ -13239,7 +13300,7 @@
         </p:nvSpPr>
         <p:spPr>
           <a:xfrm>
-            <a:off x="4287418" y="2963875"/>
+            <a:off x="4287418" y="2963876"/>
             <a:ext cx="1013900" cy="1160746"/>
           </a:xfrm>
           <a:prstGeom prst="rect">
@@ -13313,7 +13374,7 @@
         </p:blipFill>
         <p:spPr>
           <a:xfrm>
-            <a:off x="3146918" y="3251875"/>
+            <a:off x="3146921" y="3251877"/>
             <a:ext cx="914801" cy="302801"/>
           </a:xfrm>
           <a:prstGeom prst="rect">
@@ -13567,7 +13628,7 @@
         </p:nvSpPr>
         <p:spPr>
           <a:xfrm>
-            <a:off x="1231899" y="4690308"/>
+            <a:off x="1231903" y="4690310"/>
             <a:ext cx="1651001" cy="812801"/>
           </a:xfrm>
           <a:prstGeom prst="wedgeEllipseCallout">
@@ -13637,7 +13698,7 @@
         </p:nvSpPr>
         <p:spPr>
           <a:xfrm>
-            <a:off x="7035799" y="4690308"/>
+            <a:off x="7035803" y="4690310"/>
             <a:ext cx="1651001" cy="812801"/>
           </a:xfrm>
           <a:prstGeom prst="wedgeEllipseCallout">
@@ -13707,7 +13768,7 @@
         </p:nvSpPr>
         <p:spPr>
           <a:xfrm>
-            <a:off x="3782017" y="4915390"/>
+            <a:off x="3782021" y="4915393"/>
             <a:ext cx="2156271" cy="812801"/>
           </a:xfrm>
           <a:prstGeom prst="wedgeEllipseCallout">
@@ -13893,8 +13954,8 @@
         </p:blipFill>
         <p:spPr>
           <a:xfrm>
-            <a:off x="8286692" y="6053942"/>
-            <a:ext cx="900545" cy="838848"/>
+            <a:off x="8286696" y="6053944"/>
+            <a:ext cx="900545" cy="838849"/>
           </a:xfrm>
           <a:prstGeom prst="rect">
             <a:avLst/>
@@ -14084,8 +14145,8 @@
         </p:blipFill>
         <p:spPr>
           <a:xfrm>
-            <a:off x="8286692" y="6053942"/>
-            <a:ext cx="900545" cy="838848"/>
+            <a:off x="8286696" y="6053944"/>
+            <a:ext cx="900545" cy="838849"/>
           </a:xfrm>
           <a:prstGeom prst="rect">
             <a:avLst/>
@@ -14168,7 +14229,7 @@
         </p:nvSpPr>
         <p:spPr>
           <a:xfrm>
-            <a:off x="-121772" y="968729"/>
+            <a:off x="-121772" y="968732"/>
             <a:ext cx="9411471" cy="5909311"/>
           </a:xfrm>
           <a:prstGeom prst="rect">
@@ -14873,8 +14934,8 @@
         </p:blipFill>
         <p:spPr>
           <a:xfrm>
-            <a:off x="8286692" y="6053942"/>
-            <a:ext cx="900545" cy="838848"/>
+            <a:off x="8286696" y="6053944"/>
+            <a:ext cx="900545" cy="838849"/>
           </a:xfrm>
           <a:prstGeom prst="rect">
             <a:avLst/>
@@ -14965,7 +15026,7 @@
           <p:nvPr/>
         </p:nvPicPr>
         <p:blipFill>
-          <a:blip r:embed="rId2">
+          <a:blip r:embed="rId3">
             <a:extLst>
               <a:ext uri="{28A0092B-C50C-407E-A947-70E740481C1C}">
                 <a14:useLocalDpi xmlns:a14="http://schemas.microsoft.com/office/drawing/2010/main" val="0"/>
@@ -14978,8 +15039,8 @@
         </p:blipFill>
         <p:spPr>
           <a:xfrm>
-            <a:off x="8286692" y="6053942"/>
-            <a:ext cx="900545" cy="838848"/>
+            <a:off x="8286696" y="6053944"/>
+            <a:ext cx="900545" cy="838849"/>
           </a:xfrm>
           <a:prstGeom prst="rect">
             <a:avLst/>
@@ -15064,7 +15125,7 @@
         </p:nvSpPr>
         <p:spPr>
           <a:xfrm>
-            <a:off x="457200" y="3830760"/>
+            <a:off x="457200" y="3830759"/>
             <a:ext cx="8229600" cy="1143000"/>
           </a:xfrm>
           <a:prstGeom prst="rect">
@@ -15149,7 +15210,7 @@
         </p:nvSpPr>
         <p:spPr>
           <a:xfrm>
-            <a:off x="3006339" y="5589143"/>
+            <a:off x="3006343" y="5589146"/>
             <a:ext cx="1651001" cy="812801"/>
           </a:xfrm>
           <a:prstGeom prst="wedgeEllipseCallout">
@@ -15220,7 +15281,7 @@
         </p:nvSpPr>
         <p:spPr>
           <a:xfrm>
-            <a:off x="4709528" y="5589143"/>
+            <a:off x="4709532" y="5589146"/>
             <a:ext cx="1651001" cy="812801"/>
           </a:xfrm>
           <a:prstGeom prst="wedgeEllipseCallout">
@@ -15305,8 +15366,8 @@
         </p:blipFill>
         <p:spPr>
           <a:xfrm>
-            <a:off x="8286692" y="6053942"/>
-            <a:ext cx="900545" cy="838848"/>
+            <a:off x="8286696" y="6053944"/>
+            <a:ext cx="900545" cy="838849"/>
           </a:xfrm>
           <a:prstGeom prst="rect">
             <a:avLst/>
@@ -15335,7 +15396,7 @@
         </p:blipFill>
         <p:spPr>
           <a:xfrm>
-            <a:off x="451669" y="984408"/>
+            <a:off x="451669" y="984409"/>
             <a:ext cx="8735568" cy="2968752"/>
           </a:xfrm>
           <a:prstGeom prst="rect">
@@ -15491,7 +15552,7 @@
         </p:blipFill>
         <p:spPr>
           <a:xfrm>
-            <a:off x="8305876" y="6053942"/>
+            <a:off x="8305880" y="6053945"/>
             <a:ext cx="804057" cy="804057"/>
           </a:xfrm>
           <a:prstGeom prst="rect">
@@ -15507,7 +15568,7 @@
         </p:nvSpPr>
         <p:spPr>
           <a:xfrm>
-            <a:off x="6044495" y="3760875"/>
+            <a:off x="6044499" y="3760875"/>
             <a:ext cx="2642305" cy="2011544"/>
           </a:xfrm>
           <a:prstGeom prst="rect">
@@ -15577,7 +15638,7 @@
         </p:blipFill>
         <p:spPr>
           <a:xfrm>
-            <a:off x="6756414" y="4253243"/>
+            <a:off x="6756414" y="4253245"/>
             <a:ext cx="1206772" cy="1171279"/>
           </a:xfrm>
           <a:prstGeom prst="rect">
@@ -15593,7 +15654,7 @@
         </p:nvSpPr>
         <p:spPr>
           <a:xfrm>
-            <a:off x="6756414" y="6066084"/>
+            <a:off x="6756414" y="6066087"/>
             <a:ext cx="1165300" cy="679045"/>
           </a:xfrm>
           <a:prstGeom prst="flowChartMagneticDisk">

</xml_diff>